<commit_message>
Update PSY 203 STUDENT Chapter 2.pptx
</commit_message>
<xml_diff>
--- a/PSY 203 STUDENT Chapter 2.pptx
+++ b/PSY 203 STUDENT Chapter 2.pptx
@@ -5,10 +5,10 @@
     <p:sldMasterId id="2147483648" r:id="rId4"/>
   </p:sldMasterIdLst>
   <p:notesMasterIdLst>
-    <p:notesMasterId r:id="rId42"/>
+    <p:notesMasterId r:id="rId40"/>
   </p:notesMasterIdLst>
   <p:handoutMasterIdLst>
-    <p:handoutMasterId r:id="rId43"/>
+    <p:handoutMasterId r:id="rId41"/>
   </p:handoutMasterIdLst>
   <p:sldIdLst>
     <p:sldId id="318" r:id="rId5"/>
@@ -27,27 +27,25 @@
     <p:sldId id="346" r:id="rId18"/>
     <p:sldId id="357" r:id="rId19"/>
     <p:sldId id="337" r:id="rId20"/>
-    <p:sldId id="338" r:id="rId21"/>
-    <p:sldId id="359" r:id="rId22"/>
-    <p:sldId id="355" r:id="rId23"/>
-    <p:sldId id="343" r:id="rId24"/>
-    <p:sldId id="330" r:id="rId25"/>
-    <p:sldId id="329" r:id="rId26"/>
-    <p:sldId id="332" r:id="rId27"/>
-    <p:sldId id="333" r:id="rId28"/>
-    <p:sldId id="334" r:id="rId29"/>
-    <p:sldId id="335" r:id="rId30"/>
-    <p:sldId id="336" r:id="rId31"/>
-    <p:sldId id="327" r:id="rId32"/>
-    <p:sldId id="347" r:id="rId33"/>
-    <p:sldId id="348" r:id="rId34"/>
-    <p:sldId id="352" r:id="rId35"/>
-    <p:sldId id="350" r:id="rId36"/>
-    <p:sldId id="351" r:id="rId37"/>
-    <p:sldId id="354" r:id="rId38"/>
-    <p:sldId id="349" r:id="rId39"/>
-    <p:sldId id="353" r:id="rId40"/>
-    <p:sldId id="323" r:id="rId41"/>
+    <p:sldId id="327" r:id="rId21"/>
+    <p:sldId id="338" r:id="rId22"/>
+    <p:sldId id="343" r:id="rId23"/>
+    <p:sldId id="330" r:id="rId24"/>
+    <p:sldId id="329" r:id="rId25"/>
+    <p:sldId id="332" r:id="rId26"/>
+    <p:sldId id="333" r:id="rId27"/>
+    <p:sldId id="334" r:id="rId28"/>
+    <p:sldId id="335" r:id="rId29"/>
+    <p:sldId id="336" r:id="rId30"/>
+    <p:sldId id="347" r:id="rId31"/>
+    <p:sldId id="348" r:id="rId32"/>
+    <p:sldId id="352" r:id="rId33"/>
+    <p:sldId id="350" r:id="rId34"/>
+    <p:sldId id="351" r:id="rId35"/>
+    <p:sldId id="354" r:id="rId36"/>
+    <p:sldId id="349" r:id="rId37"/>
+    <p:sldId id="353" r:id="rId38"/>
+    <p:sldId id="323" r:id="rId39"/>
   </p:sldIdLst>
   <p:sldSz cx="12192000" cy="6858000"/>
   <p:notesSz cx="6858000" cy="9144000"/>
@@ -7026,7 +7024,7 @@
           <a:p>
             <a:fld id="{144DDA53-17BB-4810-91A8-94FE944ADC38}" type="datetimeFigureOut">
               <a:rPr lang="en-US" smtClean="0"/>
-              <a:t>1/20/2026</a:t>
+              <a:t>1/22/2026</a:t>
             </a:fld>
             <a:endParaRPr lang="en-US" dirty="0"/>
           </a:p>
@@ -7203,7 +7201,7 @@
           <a:p>
             <a:fld id="{6AF08D30-F807-4561-A81E-6E077448AA00}" type="datetimeFigureOut">
               <a:rPr lang="en-US" smtClean="0"/>
-              <a:t>1/20/2026</a:t>
+              <a:t>1/22/2026</a:t>
             </a:fld>
             <a:endParaRPr lang="en-US" dirty="0"/>
           </a:p>
@@ -8154,7 +8152,7 @@
           <a:bodyPr/>
           <a:lstStyle/>
           <a:p>
-            <a:endParaRPr lang="en-US" dirty="0"/>
+            <a:endParaRPr lang="en-US"/>
           </a:p>
         </p:txBody>
       </p:sp>
@@ -8180,7 +8178,7 @@
     </p:spTree>
     <p:extLst>
       <p:ext uri="{BB962C8B-B14F-4D97-AF65-F5344CB8AC3E}">
-        <p14:creationId xmlns:p14="http://schemas.microsoft.com/office/powerpoint/2010/main" val="3648709500"/>
+        <p14:creationId xmlns:p14="http://schemas.microsoft.com/office/powerpoint/2010/main" val="4245200494"/>
       </p:ext>
     </p:extLst>
   </p:cSld>
@@ -8234,7 +8232,7 @@
           <a:bodyPr/>
           <a:lstStyle/>
           <a:p>
-            <a:endParaRPr lang="en-US"/>
+            <a:endParaRPr lang="en-US" dirty="0"/>
           </a:p>
         </p:txBody>
       </p:sp>
@@ -8260,7 +8258,7 @@
     </p:spTree>
     <p:extLst>
       <p:ext uri="{BB962C8B-B14F-4D97-AF65-F5344CB8AC3E}">
-        <p14:creationId xmlns:p14="http://schemas.microsoft.com/office/powerpoint/2010/main" val="480835626"/>
+        <p14:creationId xmlns:p14="http://schemas.microsoft.com/office/powerpoint/2010/main" val="3648709500"/>
       </p:ext>
     </p:extLst>
   </p:cSld>
@@ -8340,7 +8338,7 @@
     </p:spTree>
     <p:extLst>
       <p:ext uri="{BB962C8B-B14F-4D97-AF65-F5344CB8AC3E}">
-        <p14:creationId xmlns:p14="http://schemas.microsoft.com/office/powerpoint/2010/main" val="1019698368"/>
+        <p14:creationId xmlns:p14="http://schemas.microsoft.com/office/powerpoint/2010/main" val="177549512"/>
       </p:ext>
     </p:extLst>
   </p:cSld>
@@ -8500,7 +8498,7 @@
     </p:spTree>
     <p:extLst>
       <p:ext uri="{BB962C8B-B14F-4D97-AF65-F5344CB8AC3E}">
-        <p14:creationId xmlns:p14="http://schemas.microsoft.com/office/powerpoint/2010/main" val="177549512"/>
+        <p14:creationId xmlns:p14="http://schemas.microsoft.com/office/powerpoint/2010/main" val="543444007"/>
       </p:ext>
     </p:extLst>
   </p:cSld>
@@ -8580,7 +8578,7 @@
     </p:spTree>
     <p:extLst>
       <p:ext uri="{BB962C8B-B14F-4D97-AF65-F5344CB8AC3E}">
-        <p14:creationId xmlns:p14="http://schemas.microsoft.com/office/powerpoint/2010/main" val="543444007"/>
+        <p14:creationId xmlns:p14="http://schemas.microsoft.com/office/powerpoint/2010/main" val="1655945546"/>
       </p:ext>
     </p:extLst>
   </p:cSld>
@@ -8634,7 +8632,7 @@
           <a:bodyPr/>
           <a:lstStyle/>
           <a:p>
-            <a:endParaRPr lang="en-US"/>
+            <a:endParaRPr lang="en-US" dirty="0"/>
           </a:p>
         </p:txBody>
       </p:sp>
@@ -8660,7 +8658,7 @@
     </p:spTree>
     <p:extLst>
       <p:ext uri="{BB962C8B-B14F-4D97-AF65-F5344CB8AC3E}">
-        <p14:creationId xmlns:p14="http://schemas.microsoft.com/office/powerpoint/2010/main" val="1655945546"/>
+        <p14:creationId xmlns:p14="http://schemas.microsoft.com/office/powerpoint/2010/main" val="4260925369"/>
       </p:ext>
     </p:extLst>
   </p:cSld>
@@ -8714,7 +8712,7 @@
           <a:bodyPr/>
           <a:lstStyle/>
           <a:p>
-            <a:endParaRPr lang="en-US" dirty="0"/>
+            <a:endParaRPr lang="en-US"/>
           </a:p>
         </p:txBody>
       </p:sp>
@@ -8740,7 +8738,7 @@
     </p:spTree>
     <p:extLst>
       <p:ext uri="{BB962C8B-B14F-4D97-AF65-F5344CB8AC3E}">
-        <p14:creationId xmlns:p14="http://schemas.microsoft.com/office/powerpoint/2010/main" val="4260925369"/>
+        <p14:creationId xmlns:p14="http://schemas.microsoft.com/office/powerpoint/2010/main" val="1467207207"/>
       </p:ext>
     </p:extLst>
   </p:cSld>
@@ -8820,7 +8818,7 @@
     </p:spTree>
     <p:extLst>
       <p:ext uri="{BB962C8B-B14F-4D97-AF65-F5344CB8AC3E}">
-        <p14:creationId xmlns:p14="http://schemas.microsoft.com/office/powerpoint/2010/main" val="1467207207"/>
+        <p14:creationId xmlns:p14="http://schemas.microsoft.com/office/powerpoint/2010/main" val="3162115604"/>
       </p:ext>
     </p:extLst>
   </p:cSld>
@@ -8900,7 +8898,7 @@
     </p:spTree>
     <p:extLst>
       <p:ext uri="{BB962C8B-B14F-4D97-AF65-F5344CB8AC3E}">
-        <p14:creationId xmlns:p14="http://schemas.microsoft.com/office/powerpoint/2010/main" val="3162115604"/>
+        <p14:creationId xmlns:p14="http://schemas.microsoft.com/office/powerpoint/2010/main" val="235179022"/>
       </p:ext>
     </p:extLst>
   </p:cSld>
@@ -8954,7 +8952,7 @@
           <a:bodyPr/>
           <a:lstStyle/>
           <a:p>
-            <a:endParaRPr lang="en-US"/>
+            <a:endParaRPr lang="en-US" dirty="0"/>
           </a:p>
         </p:txBody>
       </p:sp>
@@ -8980,7 +8978,7 @@
     </p:spTree>
     <p:extLst>
       <p:ext uri="{BB962C8B-B14F-4D97-AF65-F5344CB8AC3E}">
-        <p14:creationId xmlns:p14="http://schemas.microsoft.com/office/powerpoint/2010/main" val="235179022"/>
+        <p14:creationId xmlns:p14="http://schemas.microsoft.com/office/powerpoint/2010/main" val="3438065500"/>
       </p:ext>
     </p:extLst>
   </p:cSld>
@@ -9034,7 +9032,7 @@
           <a:bodyPr/>
           <a:lstStyle/>
           <a:p>
-            <a:endParaRPr lang="en-US" dirty="0"/>
+            <a:endParaRPr lang="en-US"/>
           </a:p>
         </p:txBody>
       </p:sp>
@@ -9060,7 +9058,7 @@
     </p:spTree>
     <p:extLst>
       <p:ext uri="{BB962C8B-B14F-4D97-AF65-F5344CB8AC3E}">
-        <p14:creationId xmlns:p14="http://schemas.microsoft.com/office/powerpoint/2010/main" val="3438065500"/>
+        <p14:creationId xmlns:p14="http://schemas.microsoft.com/office/powerpoint/2010/main" val="2816230033"/>
       </p:ext>
     </p:extLst>
   </p:cSld>
@@ -9114,7 +9112,7 @@
           <a:bodyPr/>
           <a:lstStyle/>
           <a:p>
-            <a:endParaRPr lang="en-US"/>
+            <a:endParaRPr lang="en-US" dirty="0"/>
           </a:p>
         </p:txBody>
       </p:sp>
@@ -9140,7 +9138,7 @@
     </p:spTree>
     <p:extLst>
       <p:ext uri="{BB962C8B-B14F-4D97-AF65-F5344CB8AC3E}">
-        <p14:creationId xmlns:p14="http://schemas.microsoft.com/office/powerpoint/2010/main" val="4245200494"/>
+        <p14:creationId xmlns:p14="http://schemas.microsoft.com/office/powerpoint/2010/main" val="2583473904"/>
       </p:ext>
     </p:extLst>
   </p:cSld>
@@ -9155,7 +9153,13 @@
   <p:cSld>
     <p:spTree>
       <p:nvGrpSpPr>
-        <p:cNvPr id="1" name=""/>
+        <p:cNvPr id="1" name="">
+          <a:extLst>
+            <a:ext uri="{FF2B5EF4-FFF2-40B4-BE49-F238E27FC236}">
+              <a16:creationId xmlns:a16="http://schemas.microsoft.com/office/drawing/2014/main" id="{A85882F6-9F2A-D08F-490D-84FFF45D3F4D}"/>
+            </a:ext>
+          </a:extLst>
+        </p:cNvPr>
         <p:cNvGrpSpPr/>
         <p:nvPr/>
       </p:nvGrpSpPr>
@@ -9169,7 +9173,13 @@
       </p:grpSpPr>
       <p:sp>
         <p:nvSpPr>
-          <p:cNvPr id="2" name="Slide Image Placeholder 1"/>
+          <p:cNvPr id="2" name="Slide Image Placeholder 1">
+            <a:extLst>
+              <a:ext uri="{FF2B5EF4-FFF2-40B4-BE49-F238E27FC236}">
+                <a16:creationId xmlns:a16="http://schemas.microsoft.com/office/drawing/2014/main" id="{59648939-ED0B-E074-7D67-C8A929FB7B88}"/>
+              </a:ext>
+            </a:extLst>
+          </p:cNvPr>
           <p:cNvSpPr>
             <a:spLocks noGrp="1" noRot="1" noChangeAspect="1"/>
           </p:cNvSpPr>
@@ -9181,7 +9191,13 @@
       </p:sp>
       <p:sp>
         <p:nvSpPr>
-          <p:cNvPr id="3" name="Notes Placeholder 2"/>
+          <p:cNvPr id="3" name="Notes Placeholder 2">
+            <a:extLst>
+              <a:ext uri="{FF2B5EF4-FFF2-40B4-BE49-F238E27FC236}">
+                <a16:creationId xmlns:a16="http://schemas.microsoft.com/office/drawing/2014/main" id="{FE5806D8-6BF2-CC5F-7776-5B951CD708F8}"/>
+              </a:ext>
+            </a:extLst>
+          </p:cNvPr>
           <p:cNvSpPr>
             <a:spLocks noGrp="1"/>
           </p:cNvSpPr>
@@ -9194,13 +9210,19 @@
           <a:bodyPr/>
           <a:lstStyle/>
           <a:p>
-            <a:endParaRPr lang="en-US"/>
+            <a:endParaRPr lang="en-US" dirty="0"/>
           </a:p>
         </p:txBody>
       </p:sp>
       <p:sp>
         <p:nvSpPr>
-          <p:cNvPr id="4" name="Slide Number Placeholder 3"/>
+          <p:cNvPr id="4" name="Slide Number Placeholder 3">
+            <a:extLst>
+              <a:ext uri="{FF2B5EF4-FFF2-40B4-BE49-F238E27FC236}">
+                <a16:creationId xmlns:a16="http://schemas.microsoft.com/office/drawing/2014/main" id="{CC897DA2-993C-F3E7-DA1C-8E40135E7866}"/>
+              </a:ext>
+            </a:extLst>
+          </p:cNvPr>
           <p:cNvSpPr>
             <a:spLocks noGrp="1"/>
           </p:cNvSpPr>
@@ -9220,7 +9242,7 @@
     </p:spTree>
     <p:extLst>
       <p:ext uri="{BB962C8B-B14F-4D97-AF65-F5344CB8AC3E}">
-        <p14:creationId xmlns:p14="http://schemas.microsoft.com/office/powerpoint/2010/main" val="2816230033"/>
+        <p14:creationId xmlns:p14="http://schemas.microsoft.com/office/powerpoint/2010/main" val="2799220487"/>
       </p:ext>
     </p:extLst>
   </p:cSld>
@@ -9380,7 +9402,7 @@
     </p:spTree>
     <p:extLst>
       <p:ext uri="{BB962C8B-B14F-4D97-AF65-F5344CB8AC3E}">
-        <p14:creationId xmlns:p14="http://schemas.microsoft.com/office/powerpoint/2010/main" val="2583473904"/>
+        <p14:creationId xmlns:p14="http://schemas.microsoft.com/office/powerpoint/2010/main" val="2014703241"/>
       </p:ext>
     </p:extLst>
   </p:cSld>
@@ -9398,7 +9420,7 @@
         <p:cNvPr id="1" name="">
           <a:extLst>
             <a:ext uri="{FF2B5EF4-FFF2-40B4-BE49-F238E27FC236}">
-              <a16:creationId xmlns:a16="http://schemas.microsoft.com/office/drawing/2014/main" id="{A85882F6-9F2A-D08F-490D-84FFF45D3F4D}"/>
+              <a16:creationId xmlns:a16="http://schemas.microsoft.com/office/drawing/2014/main" id="{5E768F01-1FF7-910C-6561-0F38AFAEDDF4}"/>
             </a:ext>
           </a:extLst>
         </p:cNvPr>
@@ -9418,7 +9440,7 @@
           <p:cNvPr id="2" name="Slide Image Placeholder 1">
             <a:extLst>
               <a:ext uri="{FF2B5EF4-FFF2-40B4-BE49-F238E27FC236}">
-                <a16:creationId xmlns:a16="http://schemas.microsoft.com/office/drawing/2014/main" id="{59648939-ED0B-E074-7D67-C8A929FB7B88}"/>
+                <a16:creationId xmlns:a16="http://schemas.microsoft.com/office/drawing/2014/main" id="{F866B13A-F1F8-4620-BB15-E805DFBE0090}"/>
               </a:ext>
             </a:extLst>
           </p:cNvPr>
@@ -9436,7 +9458,7 @@
           <p:cNvPr id="3" name="Notes Placeholder 2">
             <a:extLst>
               <a:ext uri="{FF2B5EF4-FFF2-40B4-BE49-F238E27FC236}">
-                <a16:creationId xmlns:a16="http://schemas.microsoft.com/office/drawing/2014/main" id="{FE5806D8-6BF2-CC5F-7776-5B951CD708F8}"/>
+                <a16:creationId xmlns:a16="http://schemas.microsoft.com/office/drawing/2014/main" id="{19CDC5A9-D6AC-407E-59AB-C917341F5819}"/>
               </a:ext>
             </a:extLst>
           </p:cNvPr>
@@ -9461,7 +9483,7 @@
           <p:cNvPr id="4" name="Slide Number Placeholder 3">
             <a:extLst>
               <a:ext uri="{FF2B5EF4-FFF2-40B4-BE49-F238E27FC236}">
-                <a16:creationId xmlns:a16="http://schemas.microsoft.com/office/drawing/2014/main" id="{CC897DA2-993C-F3E7-DA1C-8E40135E7866}"/>
+                <a16:creationId xmlns:a16="http://schemas.microsoft.com/office/drawing/2014/main" id="{1E6A9A90-EA37-30B8-A6BE-4DEF40DEE835}"/>
               </a:ext>
             </a:extLst>
           </p:cNvPr>
@@ -9484,7 +9506,7 @@
     </p:spTree>
     <p:extLst>
       <p:ext uri="{BB962C8B-B14F-4D97-AF65-F5344CB8AC3E}">
-        <p14:creationId xmlns:p14="http://schemas.microsoft.com/office/powerpoint/2010/main" val="2799220487"/>
+        <p14:creationId xmlns:p14="http://schemas.microsoft.com/office/powerpoint/2010/main" val="4178929294"/>
       </p:ext>
     </p:extLst>
   </p:cSld>
@@ -9495,6 +9517,110 @@
 </file>
 
 <file path=ppt/notesSlides/notesSlide32.xml><?xml version="1.0" encoding="utf-8"?>
+<p:notes xmlns:a="http://schemas.openxmlformats.org/drawingml/2006/main" xmlns:r="http://schemas.openxmlformats.org/officeDocument/2006/relationships" xmlns:p="http://schemas.openxmlformats.org/presentationml/2006/main">
+  <p:cSld>
+    <p:spTree>
+      <p:nvGrpSpPr>
+        <p:cNvPr id="1" name="">
+          <a:extLst>
+            <a:ext uri="{FF2B5EF4-FFF2-40B4-BE49-F238E27FC236}">
+              <a16:creationId xmlns:a16="http://schemas.microsoft.com/office/drawing/2014/main" id="{6AFA7A1D-5034-FD40-162D-A887519DA9FB}"/>
+            </a:ext>
+          </a:extLst>
+        </p:cNvPr>
+        <p:cNvGrpSpPr/>
+        <p:nvPr/>
+      </p:nvGrpSpPr>
+      <p:grpSpPr>
+        <a:xfrm>
+          <a:off x="0" y="0"/>
+          <a:ext cx="0" cy="0"/>
+          <a:chOff x="0" y="0"/>
+          <a:chExt cx="0" cy="0"/>
+        </a:xfrm>
+      </p:grpSpPr>
+      <p:sp>
+        <p:nvSpPr>
+          <p:cNvPr id="2" name="Slide Image Placeholder 1">
+            <a:extLst>
+              <a:ext uri="{FF2B5EF4-FFF2-40B4-BE49-F238E27FC236}">
+                <a16:creationId xmlns:a16="http://schemas.microsoft.com/office/drawing/2014/main" id="{08C1D264-4625-8899-6959-AE3ED7C422C9}"/>
+              </a:ext>
+            </a:extLst>
+          </p:cNvPr>
+          <p:cNvSpPr>
+            <a:spLocks noGrp="1" noRot="1" noChangeAspect="1"/>
+          </p:cNvSpPr>
+          <p:nvPr>
+            <p:ph type="sldImg"/>
+          </p:nvPr>
+        </p:nvSpPr>
+        <p:spPr/>
+      </p:sp>
+      <p:sp>
+        <p:nvSpPr>
+          <p:cNvPr id="3" name="Notes Placeholder 2">
+            <a:extLst>
+              <a:ext uri="{FF2B5EF4-FFF2-40B4-BE49-F238E27FC236}">
+                <a16:creationId xmlns:a16="http://schemas.microsoft.com/office/drawing/2014/main" id="{87F89773-6AB4-7D41-13E4-E6BF704FC050}"/>
+              </a:ext>
+            </a:extLst>
+          </p:cNvPr>
+          <p:cNvSpPr>
+            <a:spLocks noGrp="1"/>
+          </p:cNvSpPr>
+          <p:nvPr>
+            <p:ph type="body" idx="1"/>
+          </p:nvPr>
+        </p:nvSpPr>
+        <p:spPr/>
+        <p:txBody>
+          <a:bodyPr/>
+          <a:lstStyle/>
+          <a:p>
+            <a:endParaRPr lang="en-US" dirty="0"/>
+          </a:p>
+        </p:txBody>
+      </p:sp>
+      <p:sp>
+        <p:nvSpPr>
+          <p:cNvPr id="4" name="Slide Number Placeholder 3">
+            <a:extLst>
+              <a:ext uri="{FF2B5EF4-FFF2-40B4-BE49-F238E27FC236}">
+                <a16:creationId xmlns:a16="http://schemas.microsoft.com/office/drawing/2014/main" id="{242EE054-BDFF-3632-209B-AE10BD701398}"/>
+              </a:ext>
+            </a:extLst>
+          </p:cNvPr>
+          <p:cNvSpPr>
+            <a:spLocks noGrp="1"/>
+          </p:cNvSpPr>
+          <p:nvPr>
+            <p:ph type="sldNum" sz="quarter" idx="5"/>
+          </p:nvPr>
+        </p:nvSpPr>
+        <p:spPr/>
+        <p:txBody>
+          <a:bodyPr/>
+          <a:lstStyle/>
+          <a:p>
+            <a:endParaRPr lang="en-US" dirty="0"/>
+          </a:p>
+        </p:txBody>
+      </p:sp>
+    </p:spTree>
+    <p:extLst>
+      <p:ext uri="{BB962C8B-B14F-4D97-AF65-F5344CB8AC3E}">
+        <p14:creationId xmlns:p14="http://schemas.microsoft.com/office/powerpoint/2010/main" val="173217685"/>
+      </p:ext>
+    </p:extLst>
+  </p:cSld>
+  <p:clrMapOvr>
+    <a:masterClrMapping/>
+  </p:clrMapOvr>
+</p:notes>
+</file>
+
+<file path=ppt/notesSlides/notesSlide33.xml><?xml version="1.0" encoding="utf-8"?>
 <p:notes xmlns:a="http://schemas.openxmlformats.org/drawingml/2006/main" xmlns:r="http://schemas.openxmlformats.org/officeDocument/2006/relationships" xmlns:p="http://schemas.openxmlformats.org/presentationml/2006/main">
   <p:cSld>
     <p:spTree>
@@ -9538,7 +9664,7 @@
           <a:bodyPr/>
           <a:lstStyle/>
           <a:p>
-            <a:endParaRPr lang="en-US" dirty="0"/>
+            <a:endParaRPr lang="en-US"/>
           </a:p>
         </p:txBody>
       </p:sp>
@@ -9564,111 +9690,7 @@
     </p:spTree>
     <p:extLst>
       <p:ext uri="{BB962C8B-B14F-4D97-AF65-F5344CB8AC3E}">
-        <p14:creationId xmlns:p14="http://schemas.microsoft.com/office/powerpoint/2010/main" val="2014703241"/>
-      </p:ext>
-    </p:extLst>
-  </p:cSld>
-  <p:clrMapOvr>
-    <a:masterClrMapping/>
-  </p:clrMapOvr>
-</p:notes>
-</file>
-
-<file path=ppt/notesSlides/notesSlide33.xml><?xml version="1.0" encoding="utf-8"?>
-<p:notes xmlns:a="http://schemas.openxmlformats.org/drawingml/2006/main" xmlns:r="http://schemas.openxmlformats.org/officeDocument/2006/relationships" xmlns:p="http://schemas.openxmlformats.org/presentationml/2006/main">
-  <p:cSld>
-    <p:spTree>
-      <p:nvGrpSpPr>
-        <p:cNvPr id="1" name="">
-          <a:extLst>
-            <a:ext uri="{FF2B5EF4-FFF2-40B4-BE49-F238E27FC236}">
-              <a16:creationId xmlns:a16="http://schemas.microsoft.com/office/drawing/2014/main" id="{5E768F01-1FF7-910C-6561-0F38AFAEDDF4}"/>
-            </a:ext>
-          </a:extLst>
-        </p:cNvPr>
-        <p:cNvGrpSpPr/>
-        <p:nvPr/>
-      </p:nvGrpSpPr>
-      <p:grpSpPr>
-        <a:xfrm>
-          <a:off x="0" y="0"/>
-          <a:ext cx="0" cy="0"/>
-          <a:chOff x="0" y="0"/>
-          <a:chExt cx="0" cy="0"/>
-        </a:xfrm>
-      </p:grpSpPr>
-      <p:sp>
-        <p:nvSpPr>
-          <p:cNvPr id="2" name="Slide Image Placeholder 1">
-            <a:extLst>
-              <a:ext uri="{FF2B5EF4-FFF2-40B4-BE49-F238E27FC236}">
-                <a16:creationId xmlns:a16="http://schemas.microsoft.com/office/drawing/2014/main" id="{F866B13A-F1F8-4620-BB15-E805DFBE0090}"/>
-              </a:ext>
-            </a:extLst>
-          </p:cNvPr>
-          <p:cNvSpPr>
-            <a:spLocks noGrp="1" noRot="1" noChangeAspect="1"/>
-          </p:cNvSpPr>
-          <p:nvPr>
-            <p:ph type="sldImg"/>
-          </p:nvPr>
-        </p:nvSpPr>
-        <p:spPr/>
-      </p:sp>
-      <p:sp>
-        <p:nvSpPr>
-          <p:cNvPr id="3" name="Notes Placeholder 2">
-            <a:extLst>
-              <a:ext uri="{FF2B5EF4-FFF2-40B4-BE49-F238E27FC236}">
-                <a16:creationId xmlns:a16="http://schemas.microsoft.com/office/drawing/2014/main" id="{19CDC5A9-D6AC-407E-59AB-C917341F5819}"/>
-              </a:ext>
-            </a:extLst>
-          </p:cNvPr>
-          <p:cNvSpPr>
-            <a:spLocks noGrp="1"/>
-          </p:cNvSpPr>
-          <p:nvPr>
-            <p:ph type="body" idx="1"/>
-          </p:nvPr>
-        </p:nvSpPr>
-        <p:spPr/>
-        <p:txBody>
-          <a:bodyPr/>
-          <a:lstStyle/>
-          <a:p>
-            <a:endParaRPr lang="en-US" dirty="0"/>
-          </a:p>
-        </p:txBody>
-      </p:sp>
-      <p:sp>
-        <p:nvSpPr>
-          <p:cNvPr id="4" name="Slide Number Placeholder 3">
-            <a:extLst>
-              <a:ext uri="{FF2B5EF4-FFF2-40B4-BE49-F238E27FC236}">
-                <a16:creationId xmlns:a16="http://schemas.microsoft.com/office/drawing/2014/main" id="{1E6A9A90-EA37-30B8-A6BE-4DEF40DEE835}"/>
-              </a:ext>
-            </a:extLst>
-          </p:cNvPr>
-          <p:cNvSpPr>
-            <a:spLocks noGrp="1"/>
-          </p:cNvSpPr>
-          <p:nvPr>
-            <p:ph type="sldNum" sz="quarter" idx="5"/>
-          </p:nvPr>
-        </p:nvSpPr>
-        <p:spPr/>
-        <p:txBody>
-          <a:bodyPr/>
-          <a:lstStyle/>
-          <a:p>
-            <a:endParaRPr lang="en-US" dirty="0"/>
-          </a:p>
-        </p:txBody>
-      </p:sp>
-    </p:spTree>
-    <p:extLst>
-      <p:ext uri="{BB962C8B-B14F-4D97-AF65-F5344CB8AC3E}">
-        <p14:creationId xmlns:p14="http://schemas.microsoft.com/office/powerpoint/2010/main" val="4178929294"/>
+        <p14:creationId xmlns:p14="http://schemas.microsoft.com/office/powerpoint/2010/main" val="1945107707"/>
       </p:ext>
     </p:extLst>
   </p:cSld>
@@ -9679,110 +9701,6 @@
 </file>
 
 <file path=ppt/notesSlides/notesSlide34.xml><?xml version="1.0" encoding="utf-8"?>
-<p:notes xmlns:a="http://schemas.openxmlformats.org/drawingml/2006/main" xmlns:r="http://schemas.openxmlformats.org/officeDocument/2006/relationships" xmlns:p="http://schemas.openxmlformats.org/presentationml/2006/main">
-  <p:cSld>
-    <p:spTree>
-      <p:nvGrpSpPr>
-        <p:cNvPr id="1" name="">
-          <a:extLst>
-            <a:ext uri="{FF2B5EF4-FFF2-40B4-BE49-F238E27FC236}">
-              <a16:creationId xmlns:a16="http://schemas.microsoft.com/office/drawing/2014/main" id="{6AFA7A1D-5034-FD40-162D-A887519DA9FB}"/>
-            </a:ext>
-          </a:extLst>
-        </p:cNvPr>
-        <p:cNvGrpSpPr/>
-        <p:nvPr/>
-      </p:nvGrpSpPr>
-      <p:grpSpPr>
-        <a:xfrm>
-          <a:off x="0" y="0"/>
-          <a:ext cx="0" cy="0"/>
-          <a:chOff x="0" y="0"/>
-          <a:chExt cx="0" cy="0"/>
-        </a:xfrm>
-      </p:grpSpPr>
-      <p:sp>
-        <p:nvSpPr>
-          <p:cNvPr id="2" name="Slide Image Placeholder 1">
-            <a:extLst>
-              <a:ext uri="{FF2B5EF4-FFF2-40B4-BE49-F238E27FC236}">
-                <a16:creationId xmlns:a16="http://schemas.microsoft.com/office/drawing/2014/main" id="{08C1D264-4625-8899-6959-AE3ED7C422C9}"/>
-              </a:ext>
-            </a:extLst>
-          </p:cNvPr>
-          <p:cNvSpPr>
-            <a:spLocks noGrp="1" noRot="1" noChangeAspect="1"/>
-          </p:cNvSpPr>
-          <p:nvPr>
-            <p:ph type="sldImg"/>
-          </p:nvPr>
-        </p:nvSpPr>
-        <p:spPr/>
-      </p:sp>
-      <p:sp>
-        <p:nvSpPr>
-          <p:cNvPr id="3" name="Notes Placeholder 2">
-            <a:extLst>
-              <a:ext uri="{FF2B5EF4-FFF2-40B4-BE49-F238E27FC236}">
-                <a16:creationId xmlns:a16="http://schemas.microsoft.com/office/drawing/2014/main" id="{87F89773-6AB4-7D41-13E4-E6BF704FC050}"/>
-              </a:ext>
-            </a:extLst>
-          </p:cNvPr>
-          <p:cNvSpPr>
-            <a:spLocks noGrp="1"/>
-          </p:cNvSpPr>
-          <p:nvPr>
-            <p:ph type="body" idx="1"/>
-          </p:nvPr>
-        </p:nvSpPr>
-        <p:spPr/>
-        <p:txBody>
-          <a:bodyPr/>
-          <a:lstStyle/>
-          <a:p>
-            <a:endParaRPr lang="en-US" dirty="0"/>
-          </a:p>
-        </p:txBody>
-      </p:sp>
-      <p:sp>
-        <p:nvSpPr>
-          <p:cNvPr id="4" name="Slide Number Placeholder 3">
-            <a:extLst>
-              <a:ext uri="{FF2B5EF4-FFF2-40B4-BE49-F238E27FC236}">
-                <a16:creationId xmlns:a16="http://schemas.microsoft.com/office/drawing/2014/main" id="{242EE054-BDFF-3632-209B-AE10BD701398}"/>
-              </a:ext>
-            </a:extLst>
-          </p:cNvPr>
-          <p:cNvSpPr>
-            <a:spLocks noGrp="1"/>
-          </p:cNvSpPr>
-          <p:nvPr>
-            <p:ph type="sldNum" sz="quarter" idx="5"/>
-          </p:nvPr>
-        </p:nvSpPr>
-        <p:spPr/>
-        <p:txBody>
-          <a:bodyPr/>
-          <a:lstStyle/>
-          <a:p>
-            <a:endParaRPr lang="en-US" dirty="0"/>
-          </a:p>
-        </p:txBody>
-      </p:sp>
-    </p:spTree>
-    <p:extLst>
-      <p:ext uri="{BB962C8B-B14F-4D97-AF65-F5344CB8AC3E}">
-        <p14:creationId xmlns:p14="http://schemas.microsoft.com/office/powerpoint/2010/main" val="173217685"/>
-      </p:ext>
-    </p:extLst>
-  </p:cSld>
-  <p:clrMapOvr>
-    <a:masterClrMapping/>
-  </p:clrMapOvr>
-</p:notes>
-</file>
-
-<file path=ppt/notesSlides/notesSlide35.xml><?xml version="1.0" encoding="utf-8"?>
 <p:notes xmlns:a="http://schemas.openxmlformats.org/drawingml/2006/main" xmlns:r="http://schemas.openxmlformats.org/officeDocument/2006/relationships" xmlns:p="http://schemas.openxmlformats.org/presentationml/2006/main">
   <p:cSld>
     <p:spTree>
@@ -9826,7 +9744,7 @@
           <a:bodyPr/>
           <a:lstStyle/>
           <a:p>
-            <a:endParaRPr lang="en-US"/>
+            <a:endParaRPr lang="en-US" dirty="0"/>
           </a:p>
         </p:txBody>
       </p:sp>
@@ -9852,86 +9770,6 @@
     </p:spTree>
     <p:extLst>
       <p:ext uri="{BB962C8B-B14F-4D97-AF65-F5344CB8AC3E}">
-        <p14:creationId xmlns:p14="http://schemas.microsoft.com/office/powerpoint/2010/main" val="1945107707"/>
-      </p:ext>
-    </p:extLst>
-  </p:cSld>
-  <p:clrMapOvr>
-    <a:masterClrMapping/>
-  </p:clrMapOvr>
-</p:notes>
-</file>
-
-<file path=ppt/notesSlides/notesSlide36.xml><?xml version="1.0" encoding="utf-8"?>
-<p:notes xmlns:a="http://schemas.openxmlformats.org/drawingml/2006/main" xmlns:r="http://schemas.openxmlformats.org/officeDocument/2006/relationships" xmlns:p="http://schemas.openxmlformats.org/presentationml/2006/main">
-  <p:cSld>
-    <p:spTree>
-      <p:nvGrpSpPr>
-        <p:cNvPr id="1" name=""/>
-        <p:cNvGrpSpPr/>
-        <p:nvPr/>
-      </p:nvGrpSpPr>
-      <p:grpSpPr>
-        <a:xfrm>
-          <a:off x="0" y="0"/>
-          <a:ext cx="0" cy="0"/>
-          <a:chOff x="0" y="0"/>
-          <a:chExt cx="0" cy="0"/>
-        </a:xfrm>
-      </p:grpSpPr>
-      <p:sp>
-        <p:nvSpPr>
-          <p:cNvPr id="2" name="Slide Image Placeholder 1"/>
-          <p:cNvSpPr>
-            <a:spLocks noGrp="1" noRot="1" noChangeAspect="1"/>
-          </p:cNvSpPr>
-          <p:nvPr>
-            <p:ph type="sldImg"/>
-          </p:nvPr>
-        </p:nvSpPr>
-        <p:spPr/>
-      </p:sp>
-      <p:sp>
-        <p:nvSpPr>
-          <p:cNvPr id="3" name="Notes Placeholder 2"/>
-          <p:cNvSpPr>
-            <a:spLocks noGrp="1"/>
-          </p:cNvSpPr>
-          <p:nvPr>
-            <p:ph type="body" idx="1"/>
-          </p:nvPr>
-        </p:nvSpPr>
-        <p:spPr/>
-        <p:txBody>
-          <a:bodyPr/>
-          <a:lstStyle/>
-          <a:p>
-            <a:endParaRPr lang="en-US" dirty="0"/>
-          </a:p>
-        </p:txBody>
-      </p:sp>
-      <p:sp>
-        <p:nvSpPr>
-          <p:cNvPr id="4" name="Slide Number Placeholder 3"/>
-          <p:cNvSpPr>
-            <a:spLocks noGrp="1"/>
-          </p:cNvSpPr>
-          <p:nvPr>
-            <p:ph type="sldNum" sz="quarter" idx="5"/>
-          </p:nvPr>
-        </p:nvSpPr>
-        <p:spPr/>
-        <p:txBody>
-          <a:bodyPr/>
-          <a:lstStyle/>
-          <a:p>
-            <a:endParaRPr lang="en-US" dirty="0"/>
-          </a:p>
-        </p:txBody>
-      </p:sp>
-    </p:spTree>
-    <p:extLst>
-      <p:ext uri="{BB962C8B-B14F-4D97-AF65-F5344CB8AC3E}">
         <p14:creationId xmlns:p14="http://schemas.microsoft.com/office/powerpoint/2010/main" val="203007337"/>
       </p:ext>
     </p:extLst>
@@ -9942,7 +9780,7 @@
 </p:notes>
 </file>
 
-<file path=ppt/notesSlides/notesSlide37.xml><?xml version="1.0" encoding="utf-8"?>
+<file path=ppt/notesSlides/notesSlide35.xml><?xml version="1.0" encoding="utf-8"?>
 <p:notes xmlns:a="http://schemas.openxmlformats.org/drawingml/2006/main" xmlns:r="http://schemas.openxmlformats.org/officeDocument/2006/relationships" xmlns:p="http://schemas.openxmlformats.org/presentationml/2006/main">
   <p:cSld>
     <p:spTree>
@@ -12307,7 +12145,7 @@
             <a:fld id="{72B8B865-6043-45BC-B48D-1676CB43D17A}" type="datetime1">
               <a:rPr lang="en-US" smtClean="0"/>
               <a:pPr/>
-              <a:t>1/20/2026</a:t>
+              <a:t>1/22/2026</a:t>
             </a:fld>
             <a:endParaRPr lang="en-US" dirty="0"/>
           </a:p>
@@ -13144,7 +12982,7 @@
             <a:fld id="{72B8B865-6043-45BC-B48D-1676CB43D17A}" type="datetime1">
               <a:rPr lang="en-US" smtClean="0"/>
               <a:pPr/>
-              <a:t>1/20/2026</a:t>
+              <a:t>1/22/2026</a:t>
             </a:fld>
             <a:endParaRPr lang="en-US" dirty="0"/>
           </a:p>
@@ -15261,7 +15099,7 @@
             <a:fld id="{72B8B865-6043-45BC-B48D-1676CB43D17A}" type="datetime1">
               <a:rPr lang="en-US" smtClean="0"/>
               <a:pPr/>
-              <a:t>1/20/2026</a:t>
+              <a:t>1/22/2026</a:t>
             </a:fld>
             <a:endParaRPr lang="en-US" dirty="0"/>
           </a:p>
@@ -16185,7 +16023,7 @@
             <a:fld id="{72B8B865-6043-45BC-B48D-1676CB43D17A}" type="datetime1">
               <a:rPr lang="en-US" smtClean="0"/>
               <a:pPr/>
-              <a:t>1/20/2026</a:t>
+              <a:t>1/22/2026</a:t>
             </a:fld>
             <a:endParaRPr lang="en-US" dirty="0"/>
           </a:p>
@@ -18358,7 +18196,7 @@
             <a:fld id="{72B8B865-6043-45BC-B48D-1676CB43D17A}" type="datetime1">
               <a:rPr lang="en-US" smtClean="0"/>
               <a:pPr/>
-              <a:t>1/20/2026</a:t>
+              <a:t>1/22/2026</a:t>
             </a:fld>
             <a:endParaRPr lang="en-US" dirty="0"/>
           </a:p>
@@ -18780,7 +18618,7 @@
             <a:fld id="{72B8B865-6043-45BC-B48D-1676CB43D17A}" type="datetime1">
               <a:rPr lang="en-US" smtClean="0"/>
               <a:pPr/>
-              <a:t>1/20/2026</a:t>
+              <a:t>1/22/2026</a:t>
             </a:fld>
             <a:endParaRPr lang="en-US" dirty="0"/>
           </a:p>
@@ -19751,7 +19589,7 @@
             <a:fld id="{72B8B865-6043-45BC-B48D-1676CB43D17A}" type="datetime1">
               <a:rPr lang="en-US" smtClean="0"/>
               <a:pPr/>
-              <a:t>1/20/2026</a:t>
+              <a:t>1/22/2026</a:t>
             </a:fld>
             <a:endParaRPr lang="en-US" dirty="0"/>
           </a:p>
@@ -21251,7 +21089,7 @@
             <a:fld id="{72B8B865-6043-45BC-B48D-1676CB43D17A}" type="datetime1">
               <a:rPr lang="en-US" smtClean="0"/>
               <a:pPr/>
-              <a:t>1/20/2026</a:t>
+              <a:t>1/22/2026</a:t>
             </a:fld>
             <a:endParaRPr lang="en-US" dirty="0"/>
           </a:p>
@@ -22882,7 +22720,7 @@
             <a:fld id="{72B8B865-6043-45BC-B48D-1676CB43D17A}" type="datetime1">
               <a:rPr lang="en-US" smtClean="0"/>
               <a:pPr/>
-              <a:t>1/20/2026</a:t>
+              <a:t>1/22/2026</a:t>
             </a:fld>
             <a:endParaRPr lang="en-US" dirty="0"/>
           </a:p>
@@ -23503,7 +23341,7 @@
             <a:fld id="{72B8B865-6043-45BC-B48D-1676CB43D17A}" type="datetime1">
               <a:rPr lang="en-US" smtClean="0"/>
               <a:pPr/>
-              <a:t>1/20/2026</a:t>
+              <a:t>1/22/2026</a:t>
             </a:fld>
             <a:endParaRPr lang="en-US" dirty="0"/>
           </a:p>
@@ -25299,7 +25137,7 @@
             <a:fld id="{72B8B865-6043-45BC-B48D-1676CB43D17A}" type="datetime1">
               <a:rPr lang="en-US" smtClean="0"/>
               <a:pPr/>
-              <a:t>1/20/2026</a:t>
+              <a:t>1/22/2026</a:t>
             </a:fld>
             <a:endParaRPr lang="en-US" dirty="0"/>
           </a:p>
@@ -26141,7 +25979,7 @@
             <a:fld id="{72B8B865-6043-45BC-B48D-1676CB43D17A}" type="datetime1">
               <a:rPr lang="en-US" smtClean="0"/>
               <a:pPr/>
-              <a:t>1/20/2026</a:t>
+              <a:t>1/22/2026</a:t>
             </a:fld>
             <a:endParaRPr lang="en-US" dirty="0"/>
           </a:p>
@@ -27262,7 +27100,7 @@
             <a:fld id="{72B8B865-6043-45BC-B48D-1676CB43D17A}" type="datetime1">
               <a:rPr lang="en-US" smtClean="0"/>
               <a:pPr/>
-              <a:t>1/20/2026</a:t>
+              <a:t>1/22/2026</a:t>
             </a:fld>
             <a:endParaRPr lang="en-US" dirty="0"/>
           </a:p>
@@ -27581,7 +27419,7 @@
           <a:p>
             <a:fld id="{1D4D8EA3-B846-4160-95E9-486302147031}" type="datetime1">
               <a:rPr lang="en-US" smtClean="0"/>
-              <a:t>1/20/2026</a:t>
+              <a:t>1/22/2026</a:t>
             </a:fld>
             <a:endParaRPr lang="en-US" dirty="0"/>
           </a:p>
@@ -29069,7 +28907,7 @@
             <a:fld id="{72B8B865-6043-45BC-B48D-1676CB43D17A}" type="datetime1">
               <a:rPr lang="en-US" smtClean="0"/>
               <a:pPr/>
-              <a:t>1/20/2026</a:t>
+              <a:t>1/22/2026</a:t>
             </a:fld>
             <a:endParaRPr lang="en-US" dirty="0"/>
           </a:p>
@@ -29408,7 +29246,7 @@
           <p:cNvPr id="2" name="Title 1">
             <a:extLst>
               <a:ext uri="{FF2B5EF4-FFF2-40B4-BE49-F238E27FC236}">
-                <a16:creationId xmlns:a16="http://schemas.microsoft.com/office/drawing/2014/main" id="{5F050DFB-F3E5-7FF1-119A-C7DA99842D84}"/>
+                <a16:creationId xmlns:a16="http://schemas.microsoft.com/office/drawing/2014/main" id="{50C9797E-7D43-DE9D-6FA2-52BD1101D3C8}"/>
               </a:ext>
             </a:extLst>
           </p:cNvPr>
@@ -29426,7 +29264,7 @@
           <a:p>
             <a:r>
               <a:rPr lang="en-US" dirty="0"/>
-              <a:t>Limitations of a Correlation Study</a:t>
+              <a:t>Measuring Correlation</a:t>
             </a:r>
           </a:p>
         </p:txBody>
@@ -29436,7 +29274,7 @@
           <p:cNvPr id="3" name="Text Placeholder 2">
             <a:extLst>
               <a:ext uri="{FF2B5EF4-FFF2-40B4-BE49-F238E27FC236}">
-                <a16:creationId xmlns:a16="http://schemas.microsoft.com/office/drawing/2014/main" id="{66909310-176A-63EF-ED8E-947A24384E42}"/>
+                <a16:creationId xmlns:a16="http://schemas.microsoft.com/office/drawing/2014/main" id="{65CEA307-1309-DE85-87F5-5A42A603546C}"/>
               </a:ext>
             </a:extLst>
           </p:cNvPr>
@@ -29447,77 +29285,87 @@
             <p:ph type="body" sz="quarter" idx="10"/>
           </p:nvPr>
         </p:nvSpPr>
-        <p:spPr>
-          <a:xfrm>
-            <a:off x="641350" y="1917700"/>
-            <a:ext cx="10907016" cy="3829957"/>
-          </a:xfrm>
-        </p:spPr>
+        <p:spPr/>
         <p:txBody>
           <a:bodyPr/>
           <a:lstStyle/>
           <a:p>
             <a:r>
-              <a:rPr lang="en-US" b="1" dirty="0"/>
-              <a:t>Correlation DOES NOT EQUAL causation</a:t>
+              <a:rPr lang="en-US" dirty="0"/>
+              <a:t>As a reminder, correlation is a pattern in data where a change in one variable relates to a change in the second variable</a:t>
+            </a:r>
+          </a:p>
+          <a:p>
+            <a:r>
+              <a:rPr lang="en-US" dirty="0"/>
+              <a:t>We measure correlation with the correlation coefficient (usually represented by r) </a:t>
+            </a:r>
+          </a:p>
+          <a:p>
+            <a:r>
+              <a:rPr lang="en-US" dirty="0"/>
+              <a:t>The correlation coefficient is measured on a scale from -1 to +1</a:t>
             </a:r>
           </a:p>
           <a:p>
             <a:pPr lvl="1"/>
             <a:r>
               <a:rPr lang="en-US" dirty="0"/>
-              <a:t>Just because there is a trend between two variables, it does not mean that one variable causes the other to occur</a:t>
+              <a:t>A </a:t>
             </a:r>
-          </a:p>
-          <a:p>
             <a:r>
               <a:rPr lang="en-US" b="1" dirty="0"/>
-              <a:t>Confounding variable</a:t>
+              <a:t>positive </a:t>
+            </a:r>
+            <a:r>
+              <a:rPr lang="en-US" b="1" i="1" dirty="0"/>
+              <a:t>r </a:t>
             </a:r>
             <a:r>
               <a:rPr lang="en-US" dirty="0"/>
-              <a:t>: a separate factor that causes the relationship between two variables</a:t>
+              <a:t>represents a relationship where an increase in one variable correlates with an </a:t>
+            </a:r>
+            <a:r>
+              <a:rPr lang="en-US" u="sng" dirty="0"/>
+              <a:t>increase</a:t>
+            </a:r>
+            <a:r>
+              <a:rPr lang="en-US" dirty="0"/>
+              <a:t> in the second variable</a:t>
             </a:r>
           </a:p>
           <a:p>
             <a:pPr lvl="1"/>
             <a:r>
               <a:rPr lang="en-US" dirty="0"/>
-              <a:t>For example, while there may be a correlation between the time of day and the amount a mother yells, the confounding variable is the teenager refusing to get out of bed</a:t>
+              <a:t>A </a:t>
             </a:r>
-          </a:p>
-          <a:p>
             <a:r>
               <a:rPr lang="en-US" b="1" dirty="0"/>
-              <a:t>Illusory correlations</a:t>
+              <a:t>negative </a:t>
+            </a:r>
+            <a:r>
+              <a:rPr lang="en-US" b="1" i="1" dirty="0"/>
+              <a:t>r</a:t>
             </a:r>
             <a:r>
               <a:rPr lang="en-US" dirty="0"/>
-              <a:t>: false correlations, where people incorrectly believe a relationship exists</a:t>
+              <a:t> represents a relationship where an increase in one variable correlates with a </a:t>
+            </a:r>
+            <a:r>
+              <a:rPr lang="en-US" u="sng" dirty="0"/>
+              <a:t>decrease</a:t>
+            </a:r>
+            <a:r>
+              <a:rPr lang="en-US" dirty="0"/>
+              <a:t> in the second variable</a:t>
             </a:r>
           </a:p>
           <a:p>
             <a:pPr lvl="1"/>
             <a:r>
               <a:rPr lang="en-US" dirty="0"/>
-              <a:t>For example, believing that the phase of the moon determines human behavior</a:t>
-            </a:r>
-          </a:p>
-          <a:p>
-            <a:r>
-              <a:rPr lang="en-US" b="1" dirty="0"/>
-              <a:t>Confirmation bias</a:t>
-            </a:r>
-            <a:r>
-              <a:rPr lang="en-US" dirty="0"/>
-              <a:t>: only believing information (even false information) that confirms a preconceived notion, and ignoring contradicting information </a:t>
-            </a:r>
-          </a:p>
-          <a:p>
-            <a:pPr lvl="1"/>
-            <a:r>
-              <a:rPr lang="en-US" dirty="0"/>
-              <a:t>For example, Johnny believing that Jane must like him because she talked to him in the hallway, ignoring that she was annoyed with him</a:t>
+              <a:t>Scores closer to one (positive or negative) represent a stronger relationship, whereas scores closer to zero represent a weak relationship</a:t>
             </a:r>
           </a:p>
           <a:p>
@@ -29530,7 +29378,7 @@
           <p:cNvPr id="5" name="Slide Number Placeholder 4">
             <a:extLst>
               <a:ext uri="{FF2B5EF4-FFF2-40B4-BE49-F238E27FC236}">
-                <a16:creationId xmlns:a16="http://schemas.microsoft.com/office/drawing/2014/main" id="{4AFDEBB5-F14A-3484-401B-B58E798BEF14}"/>
+                <a16:creationId xmlns:a16="http://schemas.microsoft.com/office/drawing/2014/main" id="{2282DC3F-FD7A-0E95-ABFC-DD73B71FF1F4}"/>
               </a:ext>
             </a:extLst>
           </p:cNvPr>
@@ -29558,7 +29406,7 @@
     </p:spTree>
     <p:extLst>
       <p:ext uri="{BB962C8B-B14F-4D97-AF65-F5344CB8AC3E}">
-        <p14:creationId xmlns:p14="http://schemas.microsoft.com/office/powerpoint/2010/main" val="192091746"/>
+        <p14:creationId xmlns:p14="http://schemas.microsoft.com/office/powerpoint/2010/main" val="2680822766"/>
       </p:ext>
     </p:extLst>
   </p:cSld>
@@ -29590,7 +29438,7 @@
           <p:cNvPr id="2" name="Title 1">
             <a:extLst>
               <a:ext uri="{FF2B5EF4-FFF2-40B4-BE49-F238E27FC236}">
-                <a16:creationId xmlns:a16="http://schemas.microsoft.com/office/drawing/2014/main" id="{DCE641DB-C285-EBD1-114A-96A08DD4E96B}"/>
+                <a16:creationId xmlns:a16="http://schemas.microsoft.com/office/drawing/2014/main" id="{5F050DFB-F3E5-7FF1-119A-C7DA99842D84}"/>
               </a:ext>
             </a:extLst>
           </p:cNvPr>
@@ -29608,7 +29456,7 @@
           <a:p>
             <a:r>
               <a:rPr lang="en-US" dirty="0"/>
-              <a:t>Class Activity</a:t>
+              <a:t>Limitations of a Correlation Study</a:t>
             </a:r>
           </a:p>
         </p:txBody>
@@ -29618,7 +29466,7 @@
           <p:cNvPr id="3" name="Text Placeholder 2">
             <a:extLst>
               <a:ext uri="{FF2B5EF4-FFF2-40B4-BE49-F238E27FC236}">
-                <a16:creationId xmlns:a16="http://schemas.microsoft.com/office/drawing/2014/main" id="{659014F6-A128-57D4-997B-8E4D7822B164}"/>
+                <a16:creationId xmlns:a16="http://schemas.microsoft.com/office/drawing/2014/main" id="{66909310-176A-63EF-ED8E-947A24384E42}"/>
               </a:ext>
             </a:extLst>
           </p:cNvPr>
@@ -29629,39 +29477,77 @@
             <p:ph type="body" sz="quarter" idx="10"/>
           </p:nvPr>
         </p:nvSpPr>
-        <p:spPr/>
+        <p:spPr>
+          <a:xfrm>
+            <a:off x="641350" y="1917700"/>
+            <a:ext cx="10907016" cy="3829957"/>
+          </a:xfrm>
+        </p:spPr>
         <p:txBody>
           <a:bodyPr/>
           <a:lstStyle/>
           <a:p>
             <a:r>
-              <a:rPr lang="en-US" dirty="0"/>
-              <a:t>Get into groups of ~4 people</a:t>
-            </a:r>
-          </a:p>
-          <a:p>
-            <a:r>
-              <a:rPr lang="en-US" dirty="0"/>
-              <a:t>Add the first AND last names of all group members to your activity sheet</a:t>
-            </a:r>
-          </a:p>
-          <a:p>
-            <a:r>
-              <a:rPr lang="en-US" dirty="0"/>
-              <a:t>Read through your scenario, then create an experiment to assess the relationship discussed in your scenario</a:t>
+              <a:rPr lang="en-US" b="1" dirty="0"/>
+              <a:t>Correlation DOES NOT EQUAL causation</a:t>
             </a:r>
           </a:p>
           <a:p>
             <a:pPr lvl="1"/>
             <a:r>
               <a:rPr lang="en-US" dirty="0"/>
-              <a:t>Remember the considerations we discussed in today’s lecture</a:t>
+              <a:t>Just because there is a trend between two variables, it does not mean that one variable causes the other to occur</a:t>
             </a:r>
           </a:p>
           <a:p>
+            <a:r>
+              <a:rPr lang="en-US" b="1" dirty="0"/>
+              <a:t>Confounding variable</a:t>
+            </a:r>
             <a:r>
               <a:rPr lang="en-US" dirty="0"/>
-              <a:t>No correlations!</a:t>
+              <a:t>: a separate factor that causes the relationship between two variables</a:t>
+            </a:r>
+          </a:p>
+          <a:p>
+            <a:pPr lvl="1"/>
+            <a:r>
+              <a:rPr lang="en-US" dirty="0"/>
+              <a:t>For example, while there may be a correlation between the time of day and the amount a mother yells, the confounding variable is the teenager refusing to get out of bed</a:t>
+            </a:r>
+          </a:p>
+          <a:p>
+            <a:r>
+              <a:rPr lang="en-US" b="1" dirty="0"/>
+              <a:t>Illusory correlations</a:t>
+            </a:r>
+            <a:r>
+              <a:rPr lang="en-US" dirty="0"/>
+              <a:t>: false correlations, where people incorrectly believe a relationship exists</a:t>
+            </a:r>
+          </a:p>
+          <a:p>
+            <a:pPr lvl="1"/>
+            <a:r>
+              <a:rPr lang="en-US" dirty="0"/>
+              <a:t>For example, believing that the phase of the moon determines human behavior</a:t>
+            </a:r>
+          </a:p>
+          <a:p>
+            <a:r>
+              <a:rPr lang="en-US" b="1" dirty="0"/>
+              <a:t>Confirmation bias</a:t>
+            </a:r>
+            <a:r>
+              <a:rPr lang="en-US" dirty="0"/>
+              <a:t>: only believing information (even false information) that confirms a preconceived notion, and ignoring contradicting information </a:t>
+            </a:r>
+          </a:p>
+          <a:p>
+            <a:pPr lvl="1"/>
+            <a:r>
+              <a:rPr lang="en-US" dirty="0"/>
+              <a:t>For example, Johnny believing that Jane must like him because she talked to him in the hallway, ignoring that she was annoyed with him</a:t>
             </a:r>
           </a:p>
           <a:p>
@@ -29674,7 +29560,7 @@
           <p:cNvPr id="5" name="Slide Number Placeholder 4">
             <a:extLst>
               <a:ext uri="{FF2B5EF4-FFF2-40B4-BE49-F238E27FC236}">
-                <a16:creationId xmlns:a16="http://schemas.microsoft.com/office/drawing/2014/main" id="{1CD92B2D-04CF-2869-CAA6-14D4E10CF021}"/>
+                <a16:creationId xmlns:a16="http://schemas.microsoft.com/office/drawing/2014/main" id="{4AFDEBB5-F14A-3484-401B-B58E798BEF14}"/>
               </a:ext>
             </a:extLst>
           </p:cNvPr>
@@ -29702,7 +29588,7 @@
     </p:spTree>
     <p:extLst>
       <p:ext uri="{BB962C8B-B14F-4D97-AF65-F5344CB8AC3E}">
-        <p14:creationId xmlns:p14="http://schemas.microsoft.com/office/powerpoint/2010/main" val="3521116533"/>
+        <p14:creationId xmlns:p14="http://schemas.microsoft.com/office/powerpoint/2010/main" val="192091746"/>
       </p:ext>
     </p:extLst>
   </p:cSld>
@@ -29720,7 +29606,7 @@
         <p:cNvPr id="1" name="">
           <a:extLst>
             <a:ext uri="{FF2B5EF4-FFF2-40B4-BE49-F238E27FC236}">
-              <a16:creationId xmlns:a16="http://schemas.microsoft.com/office/drawing/2014/main" id="{B5F3D52B-EA16-8EB3-6B5D-BBB645DCD1C0}"/>
+              <a16:creationId xmlns:a16="http://schemas.microsoft.com/office/drawing/2014/main" id="{A78FB49E-6878-4557-193D-E3F017416E4B}"/>
             </a:ext>
           </a:extLst>
         </p:cNvPr>
@@ -29737,176 +29623,10 @@
       </p:grpSpPr>
       <p:sp>
         <p:nvSpPr>
-          <p:cNvPr id="5" name="Title 4">
+          <p:cNvPr id="5" name="Slide Number Placeholder 4">
             <a:extLst>
               <a:ext uri="{FF2B5EF4-FFF2-40B4-BE49-F238E27FC236}">
-                <a16:creationId xmlns:a16="http://schemas.microsoft.com/office/drawing/2014/main" id="{A571016D-6DFD-1979-F9EA-587D979D3823}"/>
-              </a:ext>
-            </a:extLst>
-          </p:cNvPr>
-          <p:cNvSpPr>
-            <a:spLocks noGrp="1"/>
-          </p:cNvSpPr>
-          <p:nvPr>
-            <p:ph type="title"/>
-          </p:nvPr>
-        </p:nvSpPr>
-        <p:spPr/>
-        <p:txBody>
-          <a:bodyPr/>
-          <a:lstStyle/>
-          <a:p>
-            <a:r>
-              <a:rPr lang="en-US" dirty="0"/>
-              <a:t>Next Time on PSY 203…</a:t>
-            </a:r>
-          </a:p>
-        </p:txBody>
-      </p:sp>
-      <p:sp>
-        <p:nvSpPr>
-          <p:cNvPr id="6" name="Content Placeholder 5">
-            <a:extLst>
-              <a:ext uri="{FF2B5EF4-FFF2-40B4-BE49-F238E27FC236}">
-                <a16:creationId xmlns:a16="http://schemas.microsoft.com/office/drawing/2014/main" id="{006688A7-67B2-584F-0D37-483003CF04B9}"/>
-              </a:ext>
-            </a:extLst>
-          </p:cNvPr>
-          <p:cNvSpPr>
-            <a:spLocks noGrp="1"/>
-          </p:cNvSpPr>
-          <p:nvPr>
-            <p:ph sz="half" idx="1"/>
-          </p:nvPr>
-        </p:nvSpPr>
-        <p:spPr/>
-        <p:txBody>
-          <a:bodyPr/>
-          <a:lstStyle/>
-          <a:p>
-            <a:r>
-              <a:rPr lang="en-US" sz="2000" b="1" dirty="0"/>
-              <a:t>Before Next Class:</a:t>
-            </a:r>
-          </a:p>
-          <a:p>
-            <a:endParaRPr lang="en-US" dirty="0"/>
-          </a:p>
-          <a:p>
-            <a:pPr marL="285750" indent="-285750">
-              <a:buFont typeface="Arial" panose="020B0604020202020204" pitchFamily="34" charset="0"/>
-              <a:buChar char="•"/>
-            </a:pPr>
-            <a:r>
-              <a:rPr lang="en-US" dirty="0"/>
-              <a:t>Take the syllabus quiz</a:t>
-            </a:r>
-          </a:p>
-          <a:p>
-            <a:pPr marL="457200" lvl="1" indent="-285750"/>
-            <a:r>
-              <a:rPr lang="en-US" dirty="0"/>
-              <a:t>Due 1/22</a:t>
-            </a:r>
-          </a:p>
-          <a:p>
-            <a:pPr marL="285750" indent="-285750">
-              <a:buFont typeface="Arial" panose="020B0604020202020204" pitchFamily="34" charset="0"/>
-              <a:buChar char="•"/>
-            </a:pPr>
-            <a:r>
-              <a:rPr lang="en-US" dirty="0"/>
-              <a:t>Complete the Introduction Sheet</a:t>
-            </a:r>
-          </a:p>
-          <a:p>
-            <a:pPr marL="514350" lvl="1" indent="-285750"/>
-            <a:r>
-              <a:rPr lang="en-US" dirty="0"/>
-              <a:t>Due 1/22</a:t>
-            </a:r>
-          </a:p>
-        </p:txBody>
-      </p:sp>
-      <p:sp>
-        <p:nvSpPr>
-          <p:cNvPr id="7" name="Content Placeholder 6">
-            <a:extLst>
-              <a:ext uri="{FF2B5EF4-FFF2-40B4-BE49-F238E27FC236}">
-                <a16:creationId xmlns:a16="http://schemas.microsoft.com/office/drawing/2014/main" id="{10DA0A4D-B276-123B-D517-BAE5256D1071}"/>
-              </a:ext>
-            </a:extLst>
-          </p:cNvPr>
-          <p:cNvSpPr>
-            <a:spLocks noGrp="1"/>
-          </p:cNvSpPr>
-          <p:nvPr>
-            <p:ph sz="half" idx="13"/>
-          </p:nvPr>
-        </p:nvSpPr>
-        <p:spPr/>
-        <p:txBody>
-          <a:bodyPr/>
-          <a:lstStyle/>
-          <a:p>
-            <a:pPr marL="0" indent="0">
-              <a:buNone/>
-            </a:pPr>
-            <a:r>
-              <a:rPr lang="en-US" sz="2000" b="1" dirty="0"/>
-              <a:t>Next Class:</a:t>
-            </a:r>
-          </a:p>
-          <a:p>
-            <a:pPr marL="0" indent="0">
-              <a:buNone/>
-            </a:pPr>
-            <a:endParaRPr lang="en-US" dirty="0"/>
-          </a:p>
-          <a:p>
-            <a:r>
-              <a:rPr lang="en-US" dirty="0"/>
-              <a:t>Continuing Chapter 2</a:t>
-            </a:r>
-          </a:p>
-        </p:txBody>
-      </p:sp>
-    </p:spTree>
-    <p:extLst>
-      <p:ext uri="{BB962C8B-B14F-4D97-AF65-F5344CB8AC3E}">
-        <p14:creationId xmlns:p14="http://schemas.microsoft.com/office/powerpoint/2010/main" val="3406709866"/>
-      </p:ext>
-    </p:extLst>
-  </p:cSld>
-  <p:clrMapOvr>
-    <a:masterClrMapping/>
-  </p:clrMapOvr>
-</p:sld>
-</file>
-
-<file path=ppt/slides/slide2.xml><?xml version="1.0" encoding="utf-8"?>
-<p:sld xmlns:a="http://schemas.openxmlformats.org/drawingml/2006/main" xmlns:r="http://schemas.openxmlformats.org/officeDocument/2006/relationships" xmlns:p="http://schemas.openxmlformats.org/presentationml/2006/main">
-  <p:cSld>
-    <p:spTree>
-      <p:nvGrpSpPr>
-        <p:cNvPr id="1" name=""/>
-        <p:cNvGrpSpPr/>
-        <p:nvPr/>
-      </p:nvGrpSpPr>
-      <p:grpSpPr>
-        <a:xfrm>
-          <a:off x="0" y="0"/>
-          <a:ext cx="0" cy="0"/>
-          <a:chOff x="0" y="0"/>
-          <a:chExt cx="0" cy="0"/>
-        </a:xfrm>
-      </p:grpSpPr>
-      <p:sp>
-        <p:nvSpPr>
-          <p:cNvPr id="5" name="Slide Number Placeholder 4">
-            <a:extLst>
-              <a:ext uri="{FF2B5EF4-FFF2-40B4-BE49-F238E27FC236}">
-                <a16:creationId xmlns:a16="http://schemas.microsoft.com/office/drawing/2014/main" id="{0539F6E6-38FE-0DDA-170A-27D2CDEB32FB}"/>
+                <a16:creationId xmlns:a16="http://schemas.microsoft.com/office/drawing/2014/main" id="{4CA26A66-F93D-EAAD-AC8C-2BC9FD8CC273}"/>
               </a:ext>
             </a:extLst>
           </p:cNvPr>
@@ -29925,7 +29645,7 @@
             <a:fld id="{294A09A9-5501-47C1-A89A-A340965A2BE2}" type="slidenum">
               <a:rPr lang="en-US" smtClean="0"/>
               <a:pPr/>
-              <a:t>2</a:t>
+              <a:t>19</a:t>
             </a:fld>
             <a:endParaRPr lang="en-US" dirty="0"/>
           </a:p>
@@ -29936,7 +29656,7 @@
           <p:cNvPr id="8" name="Title 2">
             <a:extLst>
               <a:ext uri="{FF2B5EF4-FFF2-40B4-BE49-F238E27FC236}">
-                <a16:creationId xmlns:a16="http://schemas.microsoft.com/office/drawing/2014/main" id="{87FE3359-73F5-ADDF-6176-C038ED1A6DD4}"/>
+                <a16:creationId xmlns:a16="http://schemas.microsoft.com/office/drawing/2014/main" id="{BF2A1203-3AFB-19D4-F94B-A28FFE1C350F}"/>
               </a:ext>
             </a:extLst>
           </p:cNvPr>
@@ -29978,7 +29698,7 @@
           <a:p>
             <a:r>
               <a:rPr lang="en-US" sz="4000" dirty="0"/>
-              <a:t>Psychological Research</a:t>
+              <a:t>Research Designs</a:t>
             </a:r>
           </a:p>
         </p:txBody>
@@ -29986,7 +29706,7 @@
     </p:spTree>
     <p:extLst>
       <p:ext uri="{BB962C8B-B14F-4D97-AF65-F5344CB8AC3E}">
-        <p14:creationId xmlns:p14="http://schemas.microsoft.com/office/powerpoint/2010/main" val="1193684370"/>
+        <p14:creationId xmlns:p14="http://schemas.microsoft.com/office/powerpoint/2010/main" val="1715169995"/>
       </p:ext>
     </p:extLst>
   </p:cSld>
@@ -29996,18 +29716,12 @@
 </p:sld>
 </file>
 
-<file path=ppt/slides/slide20.xml><?xml version="1.0" encoding="utf-8"?>
+<file path=ppt/slides/slide2.xml><?xml version="1.0" encoding="utf-8"?>
 <p:sld xmlns:a="http://schemas.openxmlformats.org/drawingml/2006/main" xmlns:r="http://schemas.openxmlformats.org/officeDocument/2006/relationships" xmlns:p="http://schemas.openxmlformats.org/presentationml/2006/main">
   <p:cSld>
     <p:spTree>
       <p:nvGrpSpPr>
-        <p:cNvPr id="1" name="">
-          <a:extLst>
-            <a:ext uri="{FF2B5EF4-FFF2-40B4-BE49-F238E27FC236}">
-              <a16:creationId xmlns:a16="http://schemas.microsoft.com/office/drawing/2014/main" id="{A78FB49E-6878-4557-193D-E3F017416E4B}"/>
-            </a:ext>
-          </a:extLst>
-        </p:cNvPr>
+        <p:cNvPr id="1" name=""/>
         <p:cNvGrpSpPr/>
         <p:nvPr/>
       </p:nvGrpSpPr>
@@ -30024,7 +29738,7 @@
           <p:cNvPr id="5" name="Slide Number Placeholder 4">
             <a:extLst>
               <a:ext uri="{FF2B5EF4-FFF2-40B4-BE49-F238E27FC236}">
-                <a16:creationId xmlns:a16="http://schemas.microsoft.com/office/drawing/2014/main" id="{4CA26A66-F93D-EAAD-AC8C-2BC9FD8CC273}"/>
+                <a16:creationId xmlns:a16="http://schemas.microsoft.com/office/drawing/2014/main" id="{0539F6E6-38FE-0DDA-170A-27D2CDEB32FB}"/>
               </a:ext>
             </a:extLst>
           </p:cNvPr>
@@ -30043,7 +29757,7 @@
             <a:fld id="{294A09A9-5501-47C1-A89A-A340965A2BE2}" type="slidenum">
               <a:rPr lang="en-US" smtClean="0"/>
               <a:pPr/>
-              <a:t>20</a:t>
+              <a:t>2</a:t>
             </a:fld>
             <a:endParaRPr lang="en-US" dirty="0"/>
           </a:p>
@@ -30054,7 +29768,7 @@
           <p:cNvPr id="8" name="Title 2">
             <a:extLst>
               <a:ext uri="{FF2B5EF4-FFF2-40B4-BE49-F238E27FC236}">
-                <a16:creationId xmlns:a16="http://schemas.microsoft.com/office/drawing/2014/main" id="{BF2A1203-3AFB-19D4-F94B-A28FFE1C350F}"/>
+                <a16:creationId xmlns:a16="http://schemas.microsoft.com/office/drawing/2014/main" id="{87FE3359-73F5-ADDF-6176-C038ED1A6DD4}"/>
               </a:ext>
             </a:extLst>
           </p:cNvPr>
@@ -30096,7 +29810,7 @@
           <a:p>
             <a:r>
               <a:rPr lang="en-US" sz="4000" dirty="0"/>
-              <a:t>Research Designs</a:t>
+              <a:t>Psychological Research</a:t>
             </a:r>
           </a:p>
         </p:txBody>
@@ -30104,7 +29818,7 @@
     </p:spTree>
     <p:extLst>
       <p:ext uri="{BB962C8B-B14F-4D97-AF65-F5344CB8AC3E}">
-        <p14:creationId xmlns:p14="http://schemas.microsoft.com/office/powerpoint/2010/main" val="1715169995"/>
+        <p14:creationId xmlns:p14="http://schemas.microsoft.com/office/powerpoint/2010/main" val="1193684370"/>
       </p:ext>
     </p:extLst>
   </p:cSld>
@@ -30114,7 +29828,7 @@
 </p:sld>
 </file>
 
-<file path=ppt/slides/slide21.xml><?xml version="1.0" encoding="utf-8"?>
+<file path=ppt/slides/slide20.xml><?xml version="1.0" encoding="utf-8"?>
 <p:sld xmlns:a="http://schemas.openxmlformats.org/drawingml/2006/main" xmlns:r="http://schemas.openxmlformats.org/officeDocument/2006/relationships" xmlns:p="http://schemas.openxmlformats.org/presentationml/2006/main">
   <p:cSld>
     <p:spTree>
@@ -30295,7 +30009,7 @@
             <a:fld id="{294A09A9-5501-47C1-A89A-A340965A2BE2}" type="slidenum">
               <a:rPr lang="en-US" smtClean="0"/>
               <a:pPr/>
-              <a:t>21</a:t>
+              <a:t>20</a:t>
             </a:fld>
             <a:endParaRPr lang="en-US" dirty="0"/>
           </a:p>
@@ -30314,7 +30028,7 @@
 </p:sld>
 </file>
 
-<file path=ppt/slides/slide22.xml><?xml version="1.0" encoding="utf-8"?>
+<file path=ppt/slides/slide21.xml><?xml version="1.0" encoding="utf-8"?>
 <p:sld xmlns:a="http://schemas.openxmlformats.org/drawingml/2006/main" xmlns:r="http://schemas.openxmlformats.org/officeDocument/2006/relationships" xmlns:p="http://schemas.openxmlformats.org/presentationml/2006/main">
   <p:cSld>
     <p:spTree>
@@ -30627,7 +30341,7 @@
             <a:fld id="{294A09A9-5501-47C1-A89A-A340965A2BE2}" type="slidenum">
               <a:rPr lang="en-US" smtClean="0"/>
               <a:pPr/>
-              <a:t>22</a:t>
+              <a:t>21</a:t>
             </a:fld>
             <a:endParaRPr lang="en-US" dirty="0"/>
           </a:p>
@@ -30646,7 +30360,7 @@
 </p:sld>
 </file>
 
-<file path=ppt/slides/slide23.xml><?xml version="1.0" encoding="utf-8"?>
+<file path=ppt/slides/slide22.xml><?xml version="1.0" encoding="utf-8"?>
 <p:sld xmlns:a="http://schemas.openxmlformats.org/drawingml/2006/main" xmlns:r="http://schemas.openxmlformats.org/officeDocument/2006/relationships" xmlns:p="http://schemas.openxmlformats.org/presentationml/2006/main">
   <p:cSld>
     <p:spTree>
@@ -31018,7 +30732,7 @@
             <a:fld id="{294A09A9-5501-47C1-A89A-A340965A2BE2}" type="slidenum">
               <a:rPr lang="en-US" smtClean="0"/>
               <a:pPr/>
-              <a:t>23</a:t>
+              <a:t>22</a:t>
             </a:fld>
             <a:endParaRPr lang="en-US" dirty="0"/>
           </a:p>
@@ -31037,7 +30751,7 @@
 </p:sld>
 </file>
 
-<file path=ppt/slides/slide24.xml><?xml version="1.0" encoding="utf-8"?>
+<file path=ppt/slides/slide23.xml><?xml version="1.0" encoding="utf-8"?>
 <p:sld xmlns:a="http://schemas.openxmlformats.org/drawingml/2006/main" xmlns:r="http://schemas.openxmlformats.org/officeDocument/2006/relationships" xmlns:p="http://schemas.openxmlformats.org/presentationml/2006/main">
   <p:cSld>
     <p:spTree>
@@ -31392,7 +31106,7 @@
             <a:fld id="{294A09A9-5501-47C1-A89A-A340965A2BE2}" type="slidenum">
               <a:rPr lang="en-US" smtClean="0"/>
               <a:pPr/>
-              <a:t>24</a:t>
+              <a:t>23</a:t>
             </a:fld>
             <a:endParaRPr lang="en-US" dirty="0"/>
           </a:p>
@@ -31411,7 +31125,7 @@
 </p:sld>
 </file>
 
-<file path=ppt/slides/slide25.xml><?xml version="1.0" encoding="utf-8"?>
+<file path=ppt/slides/slide24.xml><?xml version="1.0" encoding="utf-8"?>
 <p:sld xmlns:a="http://schemas.openxmlformats.org/drawingml/2006/main" xmlns:r="http://schemas.openxmlformats.org/officeDocument/2006/relationships" xmlns:p="http://schemas.openxmlformats.org/presentationml/2006/main">
   <p:cSld>
     <p:spTree>
@@ -31733,7 +31447,7 @@
             <a:fld id="{294A09A9-5501-47C1-A89A-A340965A2BE2}" type="slidenum">
               <a:rPr lang="en-US" smtClean="0"/>
               <a:pPr/>
-              <a:t>25</a:t>
+              <a:t>24</a:t>
             </a:fld>
             <a:endParaRPr lang="en-US" dirty="0"/>
           </a:p>
@@ -31752,7 +31466,7 @@
 </p:sld>
 </file>
 
-<file path=ppt/slides/slide26.xml><?xml version="1.0" encoding="utf-8"?>
+<file path=ppt/slides/slide25.xml><?xml version="1.0" encoding="utf-8"?>
 <p:sld xmlns:a="http://schemas.openxmlformats.org/drawingml/2006/main" xmlns:r="http://schemas.openxmlformats.org/officeDocument/2006/relationships" xmlns:p="http://schemas.openxmlformats.org/presentationml/2006/main">
   <p:cSld>
     <p:spTree>
@@ -32067,7 +31781,7 @@
             <a:fld id="{294A09A9-5501-47C1-A89A-A340965A2BE2}" type="slidenum">
               <a:rPr lang="en-US" smtClean="0"/>
               <a:pPr/>
-              <a:t>26</a:t>
+              <a:t>25</a:t>
             </a:fld>
             <a:endParaRPr lang="en-US" dirty="0"/>
           </a:p>
@@ -32086,7 +31800,7 @@
 </p:sld>
 </file>
 
-<file path=ppt/slides/slide27.xml><?xml version="1.0" encoding="utf-8"?>
+<file path=ppt/slides/slide26.xml><?xml version="1.0" encoding="utf-8"?>
 <p:sld xmlns:a="http://schemas.openxmlformats.org/drawingml/2006/main" xmlns:r="http://schemas.openxmlformats.org/officeDocument/2006/relationships" xmlns:p="http://schemas.openxmlformats.org/presentationml/2006/main">
   <p:cSld>
     <p:spTree>
@@ -32405,7 +32119,7 @@
             <a:fld id="{294A09A9-5501-47C1-A89A-A340965A2BE2}" type="slidenum">
               <a:rPr lang="en-US" smtClean="0"/>
               <a:pPr/>
-              <a:t>27</a:t>
+              <a:t>26</a:t>
             </a:fld>
             <a:endParaRPr lang="en-US" dirty="0"/>
           </a:p>
@@ -32424,199 +32138,7 @@
 </p:sld>
 </file>
 
-<file path=ppt/slides/slide28.xml><?xml version="1.0" encoding="utf-8"?>
-<p:sld xmlns:a="http://schemas.openxmlformats.org/drawingml/2006/main" xmlns:r="http://schemas.openxmlformats.org/officeDocument/2006/relationships" xmlns:p="http://schemas.openxmlformats.org/presentationml/2006/main">
-  <p:cSld>
-    <p:spTree>
-      <p:nvGrpSpPr>
-        <p:cNvPr id="1" name=""/>
-        <p:cNvGrpSpPr/>
-        <p:nvPr/>
-      </p:nvGrpSpPr>
-      <p:grpSpPr>
-        <a:xfrm>
-          <a:off x="0" y="0"/>
-          <a:ext cx="0" cy="0"/>
-          <a:chOff x="0" y="0"/>
-          <a:chExt cx="0" cy="0"/>
-        </a:xfrm>
-      </p:grpSpPr>
-      <p:sp>
-        <p:nvSpPr>
-          <p:cNvPr id="2" name="Title 1">
-            <a:extLst>
-              <a:ext uri="{FF2B5EF4-FFF2-40B4-BE49-F238E27FC236}">
-                <a16:creationId xmlns:a16="http://schemas.microsoft.com/office/drawing/2014/main" id="{50C9797E-7D43-DE9D-6FA2-52BD1101D3C8}"/>
-              </a:ext>
-            </a:extLst>
-          </p:cNvPr>
-          <p:cNvSpPr>
-            <a:spLocks noGrp="1"/>
-          </p:cNvSpPr>
-          <p:nvPr>
-            <p:ph type="title"/>
-          </p:nvPr>
-        </p:nvSpPr>
-        <p:spPr/>
-        <p:txBody>
-          <a:bodyPr/>
-          <a:lstStyle/>
-          <a:p>
-            <a:r>
-              <a:rPr lang="en-US" dirty="0"/>
-              <a:t>Measuring Correlation</a:t>
-            </a:r>
-          </a:p>
-        </p:txBody>
-      </p:sp>
-      <p:sp>
-        <p:nvSpPr>
-          <p:cNvPr id="3" name="Text Placeholder 2">
-            <a:extLst>
-              <a:ext uri="{FF2B5EF4-FFF2-40B4-BE49-F238E27FC236}">
-                <a16:creationId xmlns:a16="http://schemas.microsoft.com/office/drawing/2014/main" id="{65CEA307-1309-DE85-87F5-5A42A603546C}"/>
-              </a:ext>
-            </a:extLst>
-          </p:cNvPr>
-          <p:cNvSpPr>
-            <a:spLocks noGrp="1"/>
-          </p:cNvSpPr>
-          <p:nvPr>
-            <p:ph type="body" sz="quarter" idx="10"/>
-          </p:nvPr>
-        </p:nvSpPr>
-        <p:spPr/>
-        <p:txBody>
-          <a:bodyPr/>
-          <a:lstStyle/>
-          <a:p>
-            <a:r>
-              <a:rPr lang="en-US" dirty="0"/>
-              <a:t>As a reminder, correlation is a pattern in data where a change in one variable relates to a change in the second variable</a:t>
-            </a:r>
-          </a:p>
-          <a:p>
-            <a:r>
-              <a:rPr lang="en-US" dirty="0"/>
-              <a:t>We measure correlation with the correlation coefficient (usually represented by r) </a:t>
-            </a:r>
-          </a:p>
-          <a:p>
-            <a:r>
-              <a:rPr lang="en-US" dirty="0"/>
-              <a:t>The correlation coefficient is measured on a scale from -1 to +1</a:t>
-            </a:r>
-          </a:p>
-          <a:p>
-            <a:pPr lvl="1"/>
-            <a:r>
-              <a:rPr lang="en-US" dirty="0"/>
-              <a:t>A </a:t>
-            </a:r>
-            <a:r>
-              <a:rPr lang="en-US" b="1" dirty="0"/>
-              <a:t>positive </a:t>
-            </a:r>
-            <a:r>
-              <a:rPr lang="en-US" b="1" i="1" dirty="0"/>
-              <a:t>r </a:t>
-            </a:r>
-            <a:r>
-              <a:rPr lang="en-US" dirty="0"/>
-              <a:t>represents a relationship where an increase in one variable correlates with an </a:t>
-            </a:r>
-            <a:r>
-              <a:rPr lang="en-US" u="sng" dirty="0"/>
-              <a:t>increase</a:t>
-            </a:r>
-            <a:r>
-              <a:rPr lang="en-US" dirty="0"/>
-              <a:t> in the second variable</a:t>
-            </a:r>
-          </a:p>
-          <a:p>
-            <a:pPr lvl="1"/>
-            <a:r>
-              <a:rPr lang="en-US" dirty="0"/>
-              <a:t>A </a:t>
-            </a:r>
-            <a:r>
-              <a:rPr lang="en-US" b="1" dirty="0"/>
-              <a:t>negative </a:t>
-            </a:r>
-            <a:r>
-              <a:rPr lang="en-US" b="1" i="1" dirty="0"/>
-              <a:t>r</a:t>
-            </a:r>
-            <a:r>
-              <a:rPr lang="en-US" dirty="0"/>
-              <a:t> represents a relationship where an increase in one variable correlates with a </a:t>
-            </a:r>
-            <a:r>
-              <a:rPr lang="en-US" u="sng" dirty="0"/>
-              <a:t>decrease</a:t>
-            </a:r>
-            <a:r>
-              <a:rPr lang="en-US" dirty="0"/>
-              <a:t> in the second variable</a:t>
-            </a:r>
-          </a:p>
-          <a:p>
-            <a:pPr lvl="1"/>
-            <a:r>
-              <a:rPr lang="en-US" dirty="0"/>
-              <a:t>Scores closer to one (positive or negative) represent a stronger relationship, whereas scores closer to zero represent a weak relationship</a:t>
-            </a:r>
-          </a:p>
-          <a:p>
-            <a:endParaRPr lang="en-US" dirty="0"/>
-          </a:p>
-        </p:txBody>
-      </p:sp>
-      <p:sp>
-        <p:nvSpPr>
-          <p:cNvPr id="5" name="Slide Number Placeholder 4">
-            <a:extLst>
-              <a:ext uri="{FF2B5EF4-FFF2-40B4-BE49-F238E27FC236}">
-                <a16:creationId xmlns:a16="http://schemas.microsoft.com/office/drawing/2014/main" id="{2282DC3F-FD7A-0E95-ABFC-DD73B71FF1F4}"/>
-              </a:ext>
-            </a:extLst>
-          </p:cNvPr>
-          <p:cNvSpPr>
-            <a:spLocks noGrp="1"/>
-          </p:cNvSpPr>
-          <p:nvPr>
-            <p:ph type="sldNum" sz="quarter" idx="4"/>
-          </p:nvPr>
-        </p:nvSpPr>
-        <p:spPr/>
-        <p:txBody>
-          <a:bodyPr/>
-          <a:lstStyle/>
-          <a:p>
-            <a:fld id="{294A09A9-5501-47C1-A89A-A340965A2BE2}" type="slidenum">
-              <a:rPr lang="en-US" smtClean="0"/>
-              <a:pPr/>
-              <a:t>28</a:t>
-            </a:fld>
-            <a:endParaRPr lang="en-US" dirty="0"/>
-          </a:p>
-        </p:txBody>
-      </p:sp>
-    </p:spTree>
-    <p:extLst>
-      <p:ext uri="{BB962C8B-B14F-4D97-AF65-F5344CB8AC3E}">
-        <p14:creationId xmlns:p14="http://schemas.microsoft.com/office/powerpoint/2010/main" val="2680822766"/>
-      </p:ext>
-    </p:extLst>
-  </p:cSld>
-  <p:clrMapOvr>
-    <a:masterClrMapping/>
-  </p:clrMapOvr>
-</p:sld>
-</file>
-
-<file path=ppt/slides/slide29.xml><?xml version="1.0" encoding="utf-8"?>
+<file path=ppt/slides/slide27.xml><?xml version="1.0" encoding="utf-8"?>
 <p:sld xmlns:a="http://schemas.openxmlformats.org/drawingml/2006/main" xmlns:r="http://schemas.openxmlformats.org/officeDocument/2006/relationships" xmlns:p="http://schemas.openxmlformats.org/presentationml/2006/main">
   <p:cSld>
     <p:spTree>
@@ -32663,7 +32185,7 @@
             <a:fld id="{294A09A9-5501-47C1-A89A-A340965A2BE2}" type="slidenum">
               <a:rPr lang="en-US" smtClean="0"/>
               <a:pPr/>
-              <a:t>29</a:t>
+              <a:t>27</a:t>
             </a:fld>
             <a:endParaRPr lang="en-US" dirty="0"/>
           </a:p>
@@ -32734,158 +32256,7 @@
 </p:sld>
 </file>
 
-<file path=ppt/slides/slide3.xml><?xml version="1.0" encoding="utf-8"?>
-<p:sld xmlns:a="http://schemas.openxmlformats.org/drawingml/2006/main" xmlns:r="http://schemas.openxmlformats.org/officeDocument/2006/relationships" xmlns:p="http://schemas.openxmlformats.org/presentationml/2006/main">
-  <p:cSld>
-    <p:spTree>
-      <p:nvGrpSpPr>
-        <p:cNvPr id="1" name=""/>
-        <p:cNvGrpSpPr/>
-        <p:nvPr/>
-      </p:nvGrpSpPr>
-      <p:grpSpPr>
-        <a:xfrm>
-          <a:off x="0" y="0"/>
-          <a:ext cx="0" cy="0"/>
-          <a:chOff x="0" y="0"/>
-          <a:chExt cx="0" cy="0"/>
-        </a:xfrm>
-      </p:grpSpPr>
-      <p:sp>
-        <p:nvSpPr>
-          <p:cNvPr id="7" name="Title 6">
-            <a:extLst>
-              <a:ext uri="{FF2B5EF4-FFF2-40B4-BE49-F238E27FC236}">
-                <a16:creationId xmlns:a16="http://schemas.microsoft.com/office/drawing/2014/main" id="{02C374E8-C94C-C0C1-5A32-7CB372088221}"/>
-              </a:ext>
-            </a:extLst>
-          </p:cNvPr>
-          <p:cNvSpPr>
-            <a:spLocks noGrp="1"/>
-          </p:cNvSpPr>
-          <p:nvPr>
-            <p:ph type="title"/>
-          </p:nvPr>
-        </p:nvSpPr>
-        <p:spPr/>
-        <p:txBody>
-          <a:bodyPr/>
-          <a:lstStyle/>
-          <a:p>
-            <a:r>
-              <a:rPr lang="en-US" dirty="0"/>
-              <a:t>The Science of Psychology </a:t>
-            </a:r>
-          </a:p>
-        </p:txBody>
-      </p:sp>
-      <p:sp>
-        <p:nvSpPr>
-          <p:cNvPr id="8" name="Text Placeholder 7">
-            <a:extLst>
-              <a:ext uri="{FF2B5EF4-FFF2-40B4-BE49-F238E27FC236}">
-                <a16:creationId xmlns:a16="http://schemas.microsoft.com/office/drawing/2014/main" id="{FB0F8805-0366-55F5-2B5A-EB6EC74B7647}"/>
-              </a:ext>
-            </a:extLst>
-          </p:cNvPr>
-          <p:cNvSpPr>
-            <a:spLocks noGrp="1"/>
-          </p:cNvSpPr>
-          <p:nvPr>
-            <p:ph type="body" sz="quarter" idx="10"/>
-          </p:nvPr>
-        </p:nvSpPr>
-        <p:spPr/>
-        <p:txBody>
-          <a:bodyPr/>
-          <a:lstStyle/>
-          <a:p>
-            <a:r>
-              <a:rPr lang="en-US" dirty="0"/>
-              <a:t>What makes psychology a science?</a:t>
-            </a:r>
-          </a:p>
-          <a:p>
-            <a:pPr lvl="1"/>
-            <a:r>
-              <a:rPr lang="en-US" dirty="0"/>
-              <a:t>We collect evidence that we can repeatedly measure to build knowledge on the reasons (cognitive or physiological) behind behavior</a:t>
-            </a:r>
-          </a:p>
-          <a:p>
-            <a:endParaRPr lang="en-US" dirty="0"/>
-          </a:p>
-          <a:p>
-            <a:r>
-              <a:rPr lang="en-US" dirty="0"/>
-              <a:t>What makes approaching psychology as a science difficult?</a:t>
-            </a:r>
-          </a:p>
-          <a:p>
-            <a:pPr lvl="1"/>
-            <a:r>
-              <a:rPr lang="en-US" dirty="0"/>
-              <a:t>We can observe and measure behavior, but we cannot directly observe or measure the mind</a:t>
-            </a:r>
-          </a:p>
-          <a:p>
-            <a:endParaRPr lang="en-US" dirty="0"/>
-          </a:p>
-          <a:p>
-            <a:r>
-              <a:rPr lang="en-US" dirty="0"/>
-              <a:t>Why is it important that psychology is a science rather than an opinion-based debate? What consequences might there be if we didn’t treat psychology as a science?</a:t>
-            </a:r>
-          </a:p>
-          <a:p>
-            <a:endParaRPr lang="en-US" dirty="0"/>
-          </a:p>
-        </p:txBody>
-      </p:sp>
-      <p:sp>
-        <p:nvSpPr>
-          <p:cNvPr id="6" name="Slide Number Placeholder 5">
-            <a:extLst>
-              <a:ext uri="{FF2B5EF4-FFF2-40B4-BE49-F238E27FC236}">
-                <a16:creationId xmlns:a16="http://schemas.microsoft.com/office/drawing/2014/main" id="{210D744E-1B90-7CDA-C690-6763BC17E434}"/>
-              </a:ext>
-            </a:extLst>
-          </p:cNvPr>
-          <p:cNvSpPr>
-            <a:spLocks noGrp="1"/>
-          </p:cNvSpPr>
-          <p:nvPr>
-            <p:ph type="sldNum" sz="quarter" idx="4"/>
-          </p:nvPr>
-        </p:nvSpPr>
-        <p:spPr/>
-        <p:txBody>
-          <a:bodyPr/>
-          <a:lstStyle/>
-          <a:p>
-            <a:fld id="{294A09A9-5501-47C1-A89A-A340965A2BE2}" type="slidenum">
-              <a:rPr lang="en-US" smtClean="0"/>
-              <a:pPr/>
-              <a:t>3</a:t>
-            </a:fld>
-            <a:endParaRPr lang="en-US" dirty="0"/>
-          </a:p>
-        </p:txBody>
-      </p:sp>
-    </p:spTree>
-    <p:extLst>
-      <p:ext uri="{BB962C8B-B14F-4D97-AF65-F5344CB8AC3E}">
-        <p14:creationId xmlns:p14="http://schemas.microsoft.com/office/powerpoint/2010/main" val="899610662"/>
-      </p:ext>
-    </p:extLst>
-  </p:cSld>
-  <p:clrMapOvr>
-    <a:masterClrMapping/>
-  </p:clrMapOvr>
-</p:sld>
-</file>
-
-<file path=ppt/slides/slide30.xml><?xml version="1.0" encoding="utf-8"?>
+<file path=ppt/slides/slide28.xml><?xml version="1.0" encoding="utf-8"?>
 <p:sld xmlns:a="http://schemas.openxmlformats.org/drawingml/2006/main" xmlns:r="http://schemas.openxmlformats.org/officeDocument/2006/relationships" xmlns:p="http://schemas.openxmlformats.org/presentationml/2006/main">
   <p:cSld>
     <p:spTree>
@@ -33024,7 +32395,7 @@
             <a:fld id="{294A09A9-5501-47C1-A89A-A340965A2BE2}" type="slidenum">
               <a:rPr lang="en-US" smtClean="0"/>
               <a:pPr/>
-              <a:t>30</a:t>
+              <a:t>28</a:t>
             </a:fld>
             <a:endParaRPr lang="en-US" dirty="0"/>
           </a:p>
@@ -33043,7 +32414,7 @@
 </p:sld>
 </file>
 
-<file path=ppt/slides/slide31.xml><?xml version="1.0" encoding="utf-8"?>
+<file path=ppt/slides/slide29.xml><?xml version="1.0" encoding="utf-8"?>
 <p:sld xmlns:a="http://schemas.openxmlformats.org/drawingml/2006/main" xmlns:r="http://schemas.openxmlformats.org/officeDocument/2006/relationships" xmlns:p="http://schemas.openxmlformats.org/presentationml/2006/main">
   <p:cSld>
     <p:spTree>
@@ -33118,7 +32489,7 @@
             <a:fld id="{294A09A9-5501-47C1-A89A-A340965A2BE2}" type="slidenum">
               <a:rPr lang="en-US" smtClean="0"/>
               <a:pPr/>
-              <a:t>31</a:t>
+              <a:t>29</a:t>
             </a:fld>
             <a:endParaRPr lang="en-US" dirty="0"/>
           </a:p>
@@ -33211,7 +32582,158 @@
 </p:sld>
 </file>
 
-<file path=ppt/slides/slide32.xml><?xml version="1.0" encoding="utf-8"?>
+<file path=ppt/slides/slide3.xml><?xml version="1.0" encoding="utf-8"?>
+<p:sld xmlns:a="http://schemas.openxmlformats.org/drawingml/2006/main" xmlns:r="http://schemas.openxmlformats.org/officeDocument/2006/relationships" xmlns:p="http://schemas.openxmlformats.org/presentationml/2006/main">
+  <p:cSld>
+    <p:spTree>
+      <p:nvGrpSpPr>
+        <p:cNvPr id="1" name=""/>
+        <p:cNvGrpSpPr/>
+        <p:nvPr/>
+      </p:nvGrpSpPr>
+      <p:grpSpPr>
+        <a:xfrm>
+          <a:off x="0" y="0"/>
+          <a:ext cx="0" cy="0"/>
+          <a:chOff x="0" y="0"/>
+          <a:chExt cx="0" cy="0"/>
+        </a:xfrm>
+      </p:grpSpPr>
+      <p:sp>
+        <p:nvSpPr>
+          <p:cNvPr id="7" name="Title 6">
+            <a:extLst>
+              <a:ext uri="{FF2B5EF4-FFF2-40B4-BE49-F238E27FC236}">
+                <a16:creationId xmlns:a16="http://schemas.microsoft.com/office/drawing/2014/main" id="{02C374E8-C94C-C0C1-5A32-7CB372088221}"/>
+              </a:ext>
+            </a:extLst>
+          </p:cNvPr>
+          <p:cNvSpPr>
+            <a:spLocks noGrp="1"/>
+          </p:cNvSpPr>
+          <p:nvPr>
+            <p:ph type="title"/>
+          </p:nvPr>
+        </p:nvSpPr>
+        <p:spPr/>
+        <p:txBody>
+          <a:bodyPr/>
+          <a:lstStyle/>
+          <a:p>
+            <a:r>
+              <a:rPr lang="en-US" dirty="0"/>
+              <a:t>The Science of Psychology </a:t>
+            </a:r>
+          </a:p>
+        </p:txBody>
+      </p:sp>
+      <p:sp>
+        <p:nvSpPr>
+          <p:cNvPr id="8" name="Text Placeholder 7">
+            <a:extLst>
+              <a:ext uri="{FF2B5EF4-FFF2-40B4-BE49-F238E27FC236}">
+                <a16:creationId xmlns:a16="http://schemas.microsoft.com/office/drawing/2014/main" id="{FB0F8805-0366-55F5-2B5A-EB6EC74B7647}"/>
+              </a:ext>
+            </a:extLst>
+          </p:cNvPr>
+          <p:cNvSpPr>
+            <a:spLocks noGrp="1"/>
+          </p:cNvSpPr>
+          <p:nvPr>
+            <p:ph type="body" sz="quarter" idx="10"/>
+          </p:nvPr>
+        </p:nvSpPr>
+        <p:spPr/>
+        <p:txBody>
+          <a:bodyPr/>
+          <a:lstStyle/>
+          <a:p>
+            <a:r>
+              <a:rPr lang="en-US" dirty="0"/>
+              <a:t>What makes psychology a science?</a:t>
+            </a:r>
+          </a:p>
+          <a:p>
+            <a:pPr lvl="1"/>
+            <a:r>
+              <a:rPr lang="en-US" dirty="0"/>
+              <a:t>We collect evidence that we can repeatedly measure to build knowledge on the reasons (cognitive or physiological) behind behavior</a:t>
+            </a:r>
+          </a:p>
+          <a:p>
+            <a:endParaRPr lang="en-US" dirty="0"/>
+          </a:p>
+          <a:p>
+            <a:r>
+              <a:rPr lang="en-US" dirty="0"/>
+              <a:t>What makes approaching psychology as a science difficult?</a:t>
+            </a:r>
+          </a:p>
+          <a:p>
+            <a:pPr lvl="1"/>
+            <a:r>
+              <a:rPr lang="en-US" dirty="0"/>
+              <a:t>We can observe and measure behavior, but we cannot directly observe or measure the mind</a:t>
+            </a:r>
+          </a:p>
+          <a:p>
+            <a:endParaRPr lang="en-US" dirty="0"/>
+          </a:p>
+          <a:p>
+            <a:r>
+              <a:rPr lang="en-US" dirty="0"/>
+              <a:t>Why is it important that psychology is a science rather than an opinion-based debate? What consequences might there be if we didn’t treat psychology as a science?</a:t>
+            </a:r>
+          </a:p>
+          <a:p>
+            <a:endParaRPr lang="en-US" dirty="0"/>
+          </a:p>
+        </p:txBody>
+      </p:sp>
+      <p:sp>
+        <p:nvSpPr>
+          <p:cNvPr id="6" name="Slide Number Placeholder 5">
+            <a:extLst>
+              <a:ext uri="{FF2B5EF4-FFF2-40B4-BE49-F238E27FC236}">
+                <a16:creationId xmlns:a16="http://schemas.microsoft.com/office/drawing/2014/main" id="{210D744E-1B90-7CDA-C690-6763BC17E434}"/>
+              </a:ext>
+            </a:extLst>
+          </p:cNvPr>
+          <p:cNvSpPr>
+            <a:spLocks noGrp="1"/>
+          </p:cNvSpPr>
+          <p:nvPr>
+            <p:ph type="sldNum" sz="quarter" idx="4"/>
+          </p:nvPr>
+        </p:nvSpPr>
+        <p:spPr/>
+        <p:txBody>
+          <a:bodyPr/>
+          <a:lstStyle/>
+          <a:p>
+            <a:fld id="{294A09A9-5501-47C1-A89A-A340965A2BE2}" type="slidenum">
+              <a:rPr lang="en-US" smtClean="0"/>
+              <a:pPr/>
+              <a:t>3</a:t>
+            </a:fld>
+            <a:endParaRPr lang="en-US" dirty="0"/>
+          </a:p>
+        </p:txBody>
+      </p:sp>
+    </p:spTree>
+    <p:extLst>
+      <p:ext uri="{BB962C8B-B14F-4D97-AF65-F5344CB8AC3E}">
+        <p14:creationId xmlns:p14="http://schemas.microsoft.com/office/powerpoint/2010/main" val="899610662"/>
+      </p:ext>
+    </p:extLst>
+  </p:cSld>
+  <p:clrMapOvr>
+    <a:masterClrMapping/>
+  </p:clrMapOvr>
+</p:sld>
+</file>
+
+<file path=ppt/slides/slide30.xml><?xml version="1.0" encoding="utf-8"?>
 <p:sld xmlns:a="http://schemas.openxmlformats.org/drawingml/2006/main" xmlns:r="http://schemas.openxmlformats.org/officeDocument/2006/relationships" xmlns:p="http://schemas.openxmlformats.org/presentationml/2006/main">
   <p:cSld>
     <p:spTree>
@@ -33401,7 +32923,7 @@
             <a:fld id="{294A09A9-5501-47C1-A89A-A340965A2BE2}" type="slidenum">
               <a:rPr lang="en-US" smtClean="0"/>
               <a:pPr/>
-              <a:t>32</a:t>
+              <a:t>30</a:t>
             </a:fld>
             <a:endParaRPr lang="en-US" dirty="0"/>
           </a:p>
@@ -33457,7 +32979,7 @@
 </p:sld>
 </file>
 
-<file path=ppt/slides/slide33.xml><?xml version="1.0" encoding="utf-8"?>
+<file path=ppt/slides/slide31.xml><?xml version="1.0" encoding="utf-8"?>
 <p:sld xmlns:a="http://schemas.openxmlformats.org/drawingml/2006/main" xmlns:r="http://schemas.openxmlformats.org/officeDocument/2006/relationships" xmlns:p="http://schemas.openxmlformats.org/presentationml/2006/main">
   <p:cSld>
     <p:spTree>
@@ -33532,7 +33054,7 @@
             <a:fld id="{294A09A9-5501-47C1-A89A-A340965A2BE2}" type="slidenum">
               <a:rPr lang="en-US" smtClean="0"/>
               <a:pPr/>
-              <a:t>33</a:t>
+              <a:t>31</a:t>
             </a:fld>
             <a:endParaRPr lang="en-US" dirty="0"/>
           </a:p>
@@ -33619,7 +33141,7 @@
 </p:sld>
 </file>
 
-<file path=ppt/slides/slide34.xml><?xml version="1.0" encoding="utf-8"?>
+<file path=ppt/slides/slide32.xml><?xml version="1.0" encoding="utf-8"?>
 <p:sld xmlns:a="http://schemas.openxmlformats.org/drawingml/2006/main" xmlns:r="http://schemas.openxmlformats.org/officeDocument/2006/relationships" xmlns:p="http://schemas.openxmlformats.org/presentationml/2006/main">
   <p:cSld>
     <p:spTree>
@@ -33694,7 +33216,7 @@
             <a:fld id="{294A09A9-5501-47C1-A89A-A340965A2BE2}" type="slidenum">
               <a:rPr lang="en-US" smtClean="0"/>
               <a:pPr/>
-              <a:t>34</a:t>
+              <a:t>32</a:t>
             </a:fld>
             <a:endParaRPr lang="en-US" dirty="0"/>
           </a:p>
@@ -33811,7 +33333,7 @@
 </p:sld>
 </file>
 
-<file path=ppt/slides/slide35.xml><?xml version="1.0" encoding="utf-8"?>
+<file path=ppt/slides/slide33.xml><?xml version="1.0" encoding="utf-8"?>
 <p:sld xmlns:a="http://schemas.openxmlformats.org/drawingml/2006/main" xmlns:r="http://schemas.openxmlformats.org/officeDocument/2006/relationships" xmlns:p="http://schemas.openxmlformats.org/presentationml/2006/main">
   <p:cSld>
     <p:spTree>
@@ -33957,7 +33479,7 @@
             <a:fld id="{294A09A9-5501-47C1-A89A-A340965A2BE2}" type="slidenum">
               <a:rPr lang="en-US" smtClean="0"/>
               <a:pPr/>
-              <a:t>35</a:t>
+              <a:t>33</a:t>
             </a:fld>
             <a:endParaRPr lang="en-US" dirty="0"/>
           </a:p>
@@ -33976,7 +33498,7 @@
 </p:sld>
 </file>
 
-<file path=ppt/slides/slide36.xml><?xml version="1.0" encoding="utf-8"?>
+<file path=ppt/slides/slide34.xml><?xml version="1.0" encoding="utf-8"?>
 <p:sld xmlns:a="http://schemas.openxmlformats.org/drawingml/2006/main" xmlns:r="http://schemas.openxmlformats.org/officeDocument/2006/relationships" xmlns:p="http://schemas.openxmlformats.org/presentationml/2006/main">
   <p:cSld>
     <p:spTree>
@@ -34119,7 +33641,7 @@
             <a:fld id="{294A09A9-5501-47C1-A89A-A340965A2BE2}" type="slidenum">
               <a:rPr lang="en-US" smtClean="0"/>
               <a:pPr/>
-              <a:t>36</a:t>
+              <a:t>34</a:t>
             </a:fld>
             <a:endParaRPr lang="en-US" dirty="0"/>
           </a:p>
@@ -34138,7 +33660,7 @@
 </p:sld>
 </file>
 
-<file path=ppt/slides/slide37.xml><?xml version="1.0" encoding="utf-8"?>
+<file path=ppt/slides/slide35.xml><?xml version="1.0" encoding="utf-8"?>
 <p:sld xmlns:a="http://schemas.openxmlformats.org/drawingml/2006/main" xmlns:r="http://schemas.openxmlformats.org/officeDocument/2006/relationships" xmlns:p="http://schemas.openxmlformats.org/presentationml/2006/main">
   <p:cSld>
     <p:spTree>
@@ -36218,15 +35740,6 @@
 </file>
 
 <file path=customXml/item1.xml><?xml version="1.0" encoding="utf-8"?>
-<?mso-contentType ?>
-<FormTemplates xmlns="http://schemas.microsoft.com/sharepoint/v3/contenttype/forms">
-  <Display>DocumentLibraryForm</Display>
-  <Edit>DocumentLibraryForm</Edit>
-  <New>DocumentLibraryForm</New>
-</FormTemplates>
-</file>
-
-<file path=customXml/item2.xml><?xml version="1.0" encoding="utf-8"?>
 <p:properties xmlns:p="http://schemas.microsoft.com/office/2006/metadata/properties" xmlns:xsi="http://www.w3.org/2001/XMLSchema-instance" xmlns:pc="http://schemas.microsoft.com/office/infopath/2007/PartnerControls">
   <documentManagement>
     <_ip_UnifiedCompliancePolicyUIAction xmlns="http://schemas.microsoft.com/sharepoint/v3" xsi:nil="true"/>
@@ -36246,7 +35759,7 @@
 </p:properties>
 </file>
 
-<file path=customXml/item3.xml><?xml version="1.0" encoding="utf-8"?>
+<file path=customXml/item2.xml><?xml version="1.0" encoding="utf-8"?>
 <ct:contentTypeSchema xmlns:ct="http://schemas.microsoft.com/office/2006/metadata/contentType" xmlns:ma="http://schemas.microsoft.com/office/2006/metadata/properties/metaAttributes" ct:_="" ma:_="" ma:contentTypeName="Document" ma:contentTypeID="0x01010079F111ED35F8CC479449609E8A0923A6" ma:contentTypeVersion="28" ma:contentTypeDescription="Create a new document." ma:contentTypeScope="" ma:versionID="60f5a4f2d2b0abadcf532d48ebf9cb71">
   <xsd:schema xmlns:xsd="http://www.w3.org/2001/XMLSchema" xmlns:xs="http://www.w3.org/2001/XMLSchema" xmlns:p="http://schemas.microsoft.com/office/2006/metadata/properties" xmlns:ns1="http://schemas.microsoft.com/sharepoint/v3" xmlns:ns2="71af3243-3dd4-4a8d-8c0d-dd76da1f02a5" xmlns:ns3="16c05727-aa75-4e4a-9b5f-8a80a1165891" xmlns:ns4="230e9df3-be65-4c73-a93b-d1236ebd677e" targetNamespace="http://schemas.microsoft.com/office/2006/metadata/properties" ma:root="true" ma:fieldsID="7dd78129e6a1811f84807ad11c651531" ns1:_="" ns2:_="" ns3:_="" ns4:_="">
     <xsd:import namespace="http://schemas.microsoft.com/sharepoint/v3"/>
@@ -36558,15 +36071,16 @@
 </ct:contentTypeSchema>
 </file>
 
-<file path=customXml/itemProps1.xml><?xml version="1.0" encoding="utf-8"?>
-<ds:datastoreItem xmlns:ds="http://schemas.openxmlformats.org/officeDocument/2006/customXml" ds:itemID="{F55A16D6-EDBE-419D-AF8F-74F00E41AFB5}">
-  <ds:schemaRefs>
-    <ds:schemaRef ds:uri="http://schemas.microsoft.com/sharepoint/v3/contenttype/forms"/>
-  </ds:schemaRefs>
-</ds:datastoreItem>
+<file path=customXml/item3.xml><?xml version="1.0" encoding="utf-8"?>
+<?mso-contentType ?>
+<FormTemplates xmlns="http://schemas.microsoft.com/sharepoint/v3/contenttype/forms">
+  <Display>DocumentLibraryForm</Display>
+  <Edit>DocumentLibraryForm</Edit>
+  <New>DocumentLibraryForm</New>
+</FormTemplates>
 </file>
 
-<file path=customXml/itemProps2.xml><?xml version="1.0" encoding="utf-8"?>
+<file path=customXml/itemProps1.xml><?xml version="1.0" encoding="utf-8"?>
 <ds:datastoreItem xmlns:ds="http://schemas.openxmlformats.org/officeDocument/2006/customXml" ds:itemID="{25BF1A99-35F0-4B73-B737-B4DCDCD8CA57}">
   <ds:schemaRefs>
     <ds:schemaRef ds:uri="http://schemas.microsoft.com/office/2006/metadata/properties"/>
@@ -36578,7 +36092,7 @@
 </ds:datastoreItem>
 </file>
 
-<file path=customXml/itemProps3.xml><?xml version="1.0" encoding="utf-8"?>
+<file path=customXml/itemProps2.xml><?xml version="1.0" encoding="utf-8"?>
 <ds:datastoreItem xmlns:ds="http://schemas.openxmlformats.org/officeDocument/2006/customXml" ds:itemID="{07093E94-C176-4FB3-93BB-02AEE1FEC2E7}">
   <ds:schemaRefs>
     <ds:schemaRef ds:uri="http://schemas.microsoft.com/office/2006/metadata/contentType"/>
@@ -36599,6 +36113,14 @@
 </ds:datastoreItem>
 </file>
 
+<file path=customXml/itemProps3.xml><?xml version="1.0" encoding="utf-8"?>
+<ds:datastoreItem xmlns:ds="http://schemas.openxmlformats.org/officeDocument/2006/customXml" ds:itemID="{F55A16D6-EDBE-419D-AF8F-74F00E41AFB5}">
+  <ds:schemaRefs>
+    <ds:schemaRef ds:uri="http://schemas.microsoft.com/sharepoint/v3/contenttype/forms"/>
+  </ds:schemaRefs>
+</ds:datastoreItem>
+</file>
+
 <file path=docMetadata/LabelInfo.xml><?xml version="1.0" encoding="utf-8"?>
 <clbl:labelList xmlns:clbl="http://schemas.microsoft.com/office/2020/mipLabelMetadata"/>
 </file>
</xml_diff>